<commit_message>
comments on Juliana's task instructions
Comments are included in the ppt slides stored in the Emotion_Regulation_JS\instructions directory...
</commit_message>
<xml_diff>
--- a/Emotion_Regulation_JS/instructions/instructionsDiapo.pptx
+++ b/Emotion_Regulation_JS/instructions/instructionsDiapo.pptx
@@ -7,17 +7,16 @@
   <p:sldIdLst>
     <p:sldId id="257" r:id="rId2"/>
     <p:sldId id="271" r:id="rId3"/>
-    <p:sldId id="288" r:id="rId4"/>
-    <p:sldId id="272" r:id="rId5"/>
-    <p:sldId id="289" r:id="rId6"/>
-    <p:sldId id="290" r:id="rId7"/>
-    <p:sldId id="291" r:id="rId8"/>
-    <p:sldId id="260" r:id="rId9"/>
-    <p:sldId id="268" r:id="rId10"/>
-    <p:sldId id="275" r:id="rId11"/>
-    <p:sldId id="276" r:id="rId12"/>
-    <p:sldId id="278" r:id="rId13"/>
-    <p:sldId id="287" r:id="rId14"/>
+    <p:sldId id="260" r:id="rId4"/>
+    <p:sldId id="268" r:id="rId5"/>
+    <p:sldId id="275" r:id="rId6"/>
+    <p:sldId id="276" r:id="rId7"/>
+    <p:sldId id="288" r:id="rId8"/>
+    <p:sldId id="272" r:id="rId9"/>
+    <p:sldId id="289" r:id="rId10"/>
+    <p:sldId id="290" r:id="rId11"/>
+    <p:sldId id="291" r:id="rId12"/>
+    <p:sldId id="287" r:id="rId13"/>
   </p:sldIdLst>
   <p:sldSz cx="12192000" cy="6858000"/>
   <p:notesSz cx="6858000" cy="9144000"/>
@@ -124,6 +123,102 @@
 </p:presentation>
 </file>
 
+<file path=ppt/commentAuthors.xml><?xml version="1.0" encoding="utf-8"?>
+<p:cmAuthorLst xmlns:a="http://schemas.openxmlformats.org/drawingml/2006/main" xmlns:r="http://schemas.openxmlformats.org/officeDocument/2006/relationships" xmlns:p="http://schemas.openxmlformats.org/presentationml/2006/main">
+  <p:cmAuthor id="1" name="DAUNIZEAU Jean" initials="DJ" lastIdx="6" clrIdx="0">
+    <p:extLst>
+      <p:ext uri="{19B8F6BF-5375-455C-9EA6-DF929625EA0E}">
+        <p15:presenceInfo xmlns:p15="http://schemas.microsoft.com/office/powerpoint/2012/main" userId="DAUNIZEAU Jean" providerId="None"/>
+      </p:ext>
+    </p:extLst>
+  </p:cmAuthor>
+</p:cmAuthorLst>
+</file>
+
+<file path=ppt/comments/comment1.xml><?xml version="1.0" encoding="utf-8"?>
+<p:cmLst xmlns:a="http://schemas.openxmlformats.org/drawingml/2006/main" xmlns:r="http://schemas.openxmlformats.org/officeDocument/2006/relationships" xmlns:p="http://schemas.openxmlformats.org/presentationml/2006/main">
+  <p:cm authorId="1" dt="2020-05-05T11:46:19.518" idx="4">
+    <p:pos x="10" y="10"/>
+    <p:text>[...] "Dans certains essais, cela vous rendra la tâche plus facile. Dans d'autre essais, cela vous distraira, ce qui rendra la tâche plus difficile. Nous vous indiquerons systématiquement si les visages apeurés vous rendront la tâche plus facile ou plus difficile".</p:text>
+    <p:extLst>
+      <p:ext uri="{C676402C-5697-4E1C-873F-D02D1690AC5C}">
+        <p15:threadingInfo xmlns:p15="http://schemas.microsoft.com/office/powerpoint/2012/main" timeZoneBias="-120"/>
+      </p:ext>
+    </p:extLst>
+  </p:cm>
+</p:cmLst>
+</file>
+
+<file path=ppt/comments/comment2.xml><?xml version="1.0" encoding="utf-8"?>
+<p:cmLst xmlns:a="http://schemas.openxmlformats.org/drawingml/2006/main" xmlns:r="http://schemas.openxmlformats.org/officeDocument/2006/relationships" xmlns:p="http://schemas.openxmlformats.org/presentationml/2006/main">
+  <p:cm authorId="1" dt="2020-05-05T11:40:57.614" idx="1">
+    <p:pos x="10" y="10"/>
+    <p:text>Cette slide n'est pas très limpide! Quand apparait-elle?</p:text>
+    <p:extLst>
+      <p:ext uri="{C676402C-5697-4E1C-873F-D02D1690AC5C}">
+        <p15:threadingInfo xmlns:p15="http://schemas.microsoft.com/office/powerpoint/2012/main" timeZoneBias="-120"/>
+      </p:ext>
+    </p:extLst>
+  </p:cm>
+</p:cmLst>
+</file>
+
+<file path=ppt/comments/comment3.xml><?xml version="1.0" encoding="utf-8"?>
+<p:cmLst xmlns:a="http://schemas.openxmlformats.org/drawingml/2006/main" xmlns:r="http://schemas.openxmlformats.org/officeDocument/2006/relationships" xmlns:p="http://schemas.openxmlformats.org/presentationml/2006/main">
+  <p:cm authorId="1" dt="2020-05-05T11:43:22.603" idx="2">
+    <p:pos x="10" y="10"/>
+    <p:text>Je me demande s'il ne vaut pas mieux dire quelque chose comme : "pour les 15 essais suivants, les visages apeurés vont vous rendre la tâche plus difficile"?</p:text>
+    <p:extLst>
+      <p:ext uri="{C676402C-5697-4E1C-873F-D02D1690AC5C}">
+        <p15:threadingInfo xmlns:p15="http://schemas.microsoft.com/office/powerpoint/2012/main" timeZoneBias="-120"/>
+      </p:ext>
+    </p:extLst>
+  </p:cm>
+</p:cmLst>
+</file>
+
+<file path=ppt/comments/comment4.xml><?xml version="1.0" encoding="utf-8"?>
+<p:cmLst xmlns:a="http://schemas.openxmlformats.org/drawingml/2006/main" xmlns:r="http://schemas.openxmlformats.org/officeDocument/2006/relationships" xmlns:p="http://schemas.openxmlformats.org/presentationml/2006/main">
+  <p:cm authorId="1" dt="2020-05-05T11:55:17.965" idx="5">
+    <p:pos x="10" y="10"/>
+    <p:text>IDEM: Je me demande s'il ne vaut pas mieux dire quelque chose comme : "pour les 15 essais suivants, les visages apeurés vont vous rendre la tâche plus difficile"?</p:text>
+    <p:extLst>
+      <p:ext uri="{C676402C-5697-4E1C-873F-D02D1690AC5C}">
+        <p15:threadingInfo xmlns:p15="http://schemas.microsoft.com/office/powerpoint/2012/main" timeZoneBias="-120"/>
+      </p:ext>
+    </p:extLst>
+  </p:cm>
+</p:cmLst>
+</file>
+
+<file path=ppt/comments/comment5.xml><?xml version="1.0" encoding="utf-8"?>
+<p:cmLst xmlns:a="http://schemas.openxmlformats.org/drawingml/2006/main" xmlns:r="http://schemas.openxmlformats.org/officeDocument/2006/relationships" xmlns:p="http://schemas.openxmlformats.org/presentationml/2006/main">
+  <p:cm authorId="1" dt="2020-05-05T11:44:12.600" idx="3">
+    <p:pos x="10" y="10"/>
+    <p:text>Et ici: "pour les 15 essais suivants, les visages apeurés vont vous rendre la tâche plus facile"...</p:text>
+    <p:extLst>
+      <p:ext uri="{C676402C-5697-4E1C-873F-D02D1690AC5C}">
+        <p15:threadingInfo xmlns:p15="http://schemas.microsoft.com/office/powerpoint/2012/main" timeZoneBias="-120"/>
+      </p:ext>
+    </p:extLst>
+  </p:cm>
+</p:cmLst>
+</file>
+
+<file path=ppt/comments/comment6.xml><?xml version="1.0" encoding="utf-8"?>
+<p:cmLst xmlns:a="http://schemas.openxmlformats.org/drawingml/2006/main" xmlns:r="http://schemas.openxmlformats.org/officeDocument/2006/relationships" xmlns:p="http://schemas.openxmlformats.org/presentationml/2006/main">
+  <p:cm authorId="1" dt="2020-05-05T11:55:48.123" idx="6">
+    <p:pos x="10" y="10"/>
+    <p:text>IDEM: "pour les 15 essais suivants, les visages apeurés vont vous rendre la tâche plus facile"...</p:text>
+    <p:extLst>
+      <p:ext uri="{C676402C-5697-4E1C-873F-D02D1690AC5C}">
+        <p15:threadingInfo xmlns:p15="http://schemas.microsoft.com/office/powerpoint/2012/main" timeZoneBias="-120"/>
+      </p:ext>
+    </p:extLst>
+  </p:cm>
+</p:cmLst>
+</file>
+
 <file path=ppt/slideLayouts/slideLayout1.xml><?xml version="1.0" encoding="utf-8"?>
 <p:sldLayout xmlns:a="http://schemas.openxmlformats.org/drawingml/2006/main" xmlns:r="http://schemas.openxmlformats.org/officeDocument/2006/relationships" xmlns:p="http://schemas.openxmlformats.org/presentationml/2006/main" type="title" preserve="1">
   <p:cSld name="Diapositive de titre">
@@ -253,7 +348,7 @@
           <a:p>
             <a:fld id="{712DDF4E-9AD6-4EE5-9343-468C572CABA6}" type="datetimeFigureOut">
               <a:rPr lang="fr-FR" smtClean="0"/>
-              <a:t>23/04/2020</a:t>
+              <a:t>05/05/2020</a:t>
             </a:fld>
             <a:endParaRPr lang="fr-FR" dirty="0"/>
           </a:p>
@@ -295,7 +390,7 @@
           <a:p>
             <a:fld id="{6496F53C-98F8-4EF1-8F44-F193611899A2}" type="slidenum">
               <a:rPr lang="fr-FR" smtClean="0"/>
-              <a:t>‹#›</a:t>
+              <a:t>‹N°›</a:t>
             </a:fld>
             <a:endParaRPr lang="fr-FR" dirty="0"/>
           </a:p>
@@ -421,7 +516,7 @@
           <a:p>
             <a:fld id="{712DDF4E-9AD6-4EE5-9343-468C572CABA6}" type="datetimeFigureOut">
               <a:rPr lang="fr-FR" smtClean="0"/>
-              <a:t>23/04/2020</a:t>
+              <a:t>05/05/2020</a:t>
             </a:fld>
             <a:endParaRPr lang="fr-FR" dirty="0"/>
           </a:p>
@@ -463,7 +558,7 @@
           <a:p>
             <a:fld id="{6496F53C-98F8-4EF1-8F44-F193611899A2}" type="slidenum">
               <a:rPr lang="fr-FR" smtClean="0"/>
-              <a:t>‹#›</a:t>
+              <a:t>‹N°›</a:t>
             </a:fld>
             <a:endParaRPr lang="fr-FR" dirty="0"/>
           </a:p>
@@ -599,7 +694,7 @@
           <a:p>
             <a:fld id="{712DDF4E-9AD6-4EE5-9343-468C572CABA6}" type="datetimeFigureOut">
               <a:rPr lang="fr-FR" smtClean="0"/>
-              <a:t>23/04/2020</a:t>
+              <a:t>05/05/2020</a:t>
             </a:fld>
             <a:endParaRPr lang="fr-FR" dirty="0"/>
           </a:p>
@@ -641,7 +736,7 @@
           <a:p>
             <a:fld id="{6496F53C-98F8-4EF1-8F44-F193611899A2}" type="slidenum">
               <a:rPr lang="fr-FR" smtClean="0"/>
-              <a:t>‹#›</a:t>
+              <a:t>‹N°›</a:t>
             </a:fld>
             <a:endParaRPr lang="fr-FR" dirty="0"/>
           </a:p>
@@ -767,7 +862,7 @@
           <a:p>
             <a:fld id="{712DDF4E-9AD6-4EE5-9343-468C572CABA6}" type="datetimeFigureOut">
               <a:rPr lang="fr-FR" smtClean="0"/>
-              <a:t>23/04/2020</a:t>
+              <a:t>05/05/2020</a:t>
             </a:fld>
             <a:endParaRPr lang="fr-FR" dirty="0"/>
           </a:p>
@@ -809,7 +904,7 @@
           <a:p>
             <a:fld id="{6496F53C-98F8-4EF1-8F44-F193611899A2}" type="slidenum">
               <a:rPr lang="fr-FR" smtClean="0"/>
-              <a:t>‹#›</a:t>
+              <a:t>‹N°›</a:t>
             </a:fld>
             <a:endParaRPr lang="fr-FR" dirty="0"/>
           </a:p>
@@ -1012,7 +1107,7 @@
           <a:p>
             <a:fld id="{712DDF4E-9AD6-4EE5-9343-468C572CABA6}" type="datetimeFigureOut">
               <a:rPr lang="fr-FR" smtClean="0"/>
-              <a:t>23/04/2020</a:t>
+              <a:t>05/05/2020</a:t>
             </a:fld>
             <a:endParaRPr lang="fr-FR" dirty="0"/>
           </a:p>
@@ -1054,7 +1149,7 @@
           <a:p>
             <a:fld id="{6496F53C-98F8-4EF1-8F44-F193611899A2}" type="slidenum">
               <a:rPr lang="fr-FR" smtClean="0"/>
-              <a:t>‹#›</a:t>
+              <a:t>‹N°›</a:t>
             </a:fld>
             <a:endParaRPr lang="fr-FR" dirty="0"/>
           </a:p>
@@ -1241,7 +1336,7 @@
           <a:p>
             <a:fld id="{712DDF4E-9AD6-4EE5-9343-468C572CABA6}" type="datetimeFigureOut">
               <a:rPr lang="fr-FR" smtClean="0"/>
-              <a:t>23/04/2020</a:t>
+              <a:t>05/05/2020</a:t>
             </a:fld>
             <a:endParaRPr lang="fr-FR" dirty="0"/>
           </a:p>
@@ -1283,7 +1378,7 @@
           <a:p>
             <a:fld id="{6496F53C-98F8-4EF1-8F44-F193611899A2}" type="slidenum">
               <a:rPr lang="fr-FR" smtClean="0"/>
-              <a:t>‹#›</a:t>
+              <a:t>‹N°›</a:t>
             </a:fld>
             <a:endParaRPr lang="fr-FR" dirty="0"/>
           </a:p>
@@ -1605,7 +1700,7 @@
           <a:p>
             <a:fld id="{712DDF4E-9AD6-4EE5-9343-468C572CABA6}" type="datetimeFigureOut">
               <a:rPr lang="fr-FR" smtClean="0"/>
-              <a:t>23/04/2020</a:t>
+              <a:t>05/05/2020</a:t>
             </a:fld>
             <a:endParaRPr lang="fr-FR" dirty="0"/>
           </a:p>
@@ -1647,7 +1742,7 @@
           <a:p>
             <a:fld id="{6496F53C-98F8-4EF1-8F44-F193611899A2}" type="slidenum">
               <a:rPr lang="fr-FR" smtClean="0"/>
-              <a:t>‹#›</a:t>
+              <a:t>‹N°›</a:t>
             </a:fld>
             <a:endParaRPr lang="fr-FR" dirty="0"/>
           </a:p>
@@ -1722,7 +1817,7 @@
           <a:p>
             <a:fld id="{712DDF4E-9AD6-4EE5-9343-468C572CABA6}" type="datetimeFigureOut">
               <a:rPr lang="fr-FR" smtClean="0"/>
-              <a:t>23/04/2020</a:t>
+              <a:t>05/05/2020</a:t>
             </a:fld>
             <a:endParaRPr lang="fr-FR" dirty="0"/>
           </a:p>
@@ -1764,7 +1859,7 @@
           <a:p>
             <a:fld id="{6496F53C-98F8-4EF1-8F44-F193611899A2}" type="slidenum">
               <a:rPr lang="fr-FR" smtClean="0"/>
-              <a:t>‹#›</a:t>
+              <a:t>‹N°›</a:t>
             </a:fld>
             <a:endParaRPr lang="fr-FR" dirty="0"/>
           </a:p>
@@ -1817,7 +1912,7 @@
           <a:p>
             <a:fld id="{712DDF4E-9AD6-4EE5-9343-468C572CABA6}" type="datetimeFigureOut">
               <a:rPr lang="fr-FR" smtClean="0"/>
-              <a:t>23/04/2020</a:t>
+              <a:t>05/05/2020</a:t>
             </a:fld>
             <a:endParaRPr lang="fr-FR" dirty="0"/>
           </a:p>
@@ -1859,7 +1954,7 @@
           <a:p>
             <a:fld id="{6496F53C-98F8-4EF1-8F44-F193611899A2}" type="slidenum">
               <a:rPr lang="fr-FR" smtClean="0"/>
-              <a:t>‹#›</a:t>
+              <a:t>‹N°›</a:t>
             </a:fld>
             <a:endParaRPr lang="fr-FR" dirty="0"/>
           </a:p>
@@ -2092,7 +2187,7 @@
           <a:p>
             <a:fld id="{712DDF4E-9AD6-4EE5-9343-468C572CABA6}" type="datetimeFigureOut">
               <a:rPr lang="fr-FR" smtClean="0"/>
-              <a:t>23/04/2020</a:t>
+              <a:t>05/05/2020</a:t>
             </a:fld>
             <a:endParaRPr lang="fr-FR" dirty="0"/>
           </a:p>
@@ -2134,7 +2229,7 @@
           <a:p>
             <a:fld id="{6496F53C-98F8-4EF1-8F44-F193611899A2}" type="slidenum">
               <a:rPr lang="fr-FR" smtClean="0"/>
-              <a:t>‹#›</a:t>
+              <a:t>‹N°›</a:t>
             </a:fld>
             <a:endParaRPr lang="fr-FR" dirty="0"/>
           </a:p>
@@ -2344,7 +2439,7 @@
           <a:p>
             <a:fld id="{712DDF4E-9AD6-4EE5-9343-468C572CABA6}" type="datetimeFigureOut">
               <a:rPr lang="fr-FR" smtClean="0"/>
-              <a:t>23/04/2020</a:t>
+              <a:t>05/05/2020</a:t>
             </a:fld>
             <a:endParaRPr lang="fr-FR" dirty="0"/>
           </a:p>
@@ -2386,7 +2481,7 @@
           <a:p>
             <a:fld id="{6496F53C-98F8-4EF1-8F44-F193611899A2}" type="slidenum">
               <a:rPr lang="fr-FR" smtClean="0"/>
-              <a:t>‹#›</a:t>
+              <a:t>‹N°›</a:t>
             </a:fld>
             <a:endParaRPr lang="fr-FR" dirty="0"/>
           </a:p>
@@ -2555,7 +2650,7 @@
           <a:p>
             <a:fld id="{712DDF4E-9AD6-4EE5-9343-468C572CABA6}" type="datetimeFigureOut">
               <a:rPr lang="fr-FR" smtClean="0"/>
-              <a:t>23/04/2020</a:t>
+              <a:t>05/05/2020</a:t>
             </a:fld>
             <a:endParaRPr lang="fr-FR" dirty="0"/>
           </a:p>
@@ -2633,7 +2728,7 @@
           <a:p>
             <a:fld id="{6496F53C-98F8-4EF1-8F44-F193611899A2}" type="slidenum">
               <a:rPr lang="fr-FR" smtClean="0"/>
-              <a:t>‹#›</a:t>
+              <a:t>‹N°›</a:t>
             </a:fld>
             <a:endParaRPr lang="fr-FR" dirty="0"/>
           </a:p>
@@ -3251,1062 +3346,17 @@
   <p:clrMapOvr>
     <a:masterClrMapping/>
   </p:clrMapOvr>
+  <p:timing>
+    <p:tnLst>
+      <p:par>
+        <p:cTn id="1" dur="indefinite" restart="never" nodeType="tmRoot"/>
+      </p:par>
+    </p:tnLst>
+  </p:timing>
 </p:sld>
 </file>
 
 <file path=ppt/slides/slide10.xml><?xml version="1.0" encoding="utf-8"?>
-<p:sld xmlns:a="http://schemas.openxmlformats.org/drawingml/2006/main" xmlns:r="http://schemas.openxmlformats.org/officeDocument/2006/relationships" xmlns:p="http://schemas.openxmlformats.org/presentationml/2006/main">
-  <p:cSld>
-    <p:spTree>
-      <p:nvGrpSpPr>
-        <p:cNvPr id="1" name=""/>
-        <p:cNvGrpSpPr/>
-        <p:nvPr/>
-      </p:nvGrpSpPr>
-      <p:grpSpPr>
-        <a:xfrm>
-          <a:off x="0" y="0"/>
-          <a:ext cx="0" cy="0"/>
-          <a:chOff x="0" y="0"/>
-          <a:chExt cx="0" cy="0"/>
-        </a:xfrm>
-      </p:grpSpPr>
-      <p:sp>
-        <p:nvSpPr>
-          <p:cNvPr id="2" name="Titre 1"/>
-          <p:cNvSpPr>
-            <a:spLocks noGrp="1"/>
-          </p:cNvSpPr>
-          <p:nvPr>
-            <p:ph type="title"/>
-          </p:nvPr>
-        </p:nvSpPr>
-        <p:spPr/>
-        <p:txBody>
-          <a:bodyPr/>
-          <a:lstStyle/>
-          <a:p>
-            <a:r>
-              <a:rPr lang="fr-FR" dirty="0"/>
-              <a:t>Entrainement pour le </a:t>
-            </a:r>
-            <a:r>
-              <a:rPr lang="fr-FR" i="1" dirty="0"/>
-              <a:t>jeu de détection</a:t>
-            </a:r>
-            <a:endParaRPr lang="fr-FR" dirty="0"/>
-          </a:p>
-        </p:txBody>
-      </p:sp>
-      <p:sp>
-        <p:nvSpPr>
-          <p:cNvPr id="5" name="Espace réservé du contenu 4"/>
-          <p:cNvSpPr>
-            <a:spLocks noGrp="1"/>
-          </p:cNvSpPr>
-          <p:nvPr>
-            <p:ph idx="1"/>
-          </p:nvPr>
-        </p:nvSpPr>
-        <p:spPr>
-          <a:xfrm>
-            <a:off x="838200" y="1825625"/>
-            <a:ext cx="10608425" cy="4351338"/>
-          </a:xfrm>
-        </p:spPr>
-        <p:txBody>
-          <a:bodyPr/>
-          <a:lstStyle/>
-          <a:p>
-            <a:pPr marL="0" indent="0">
-              <a:buNone/>
-            </a:pPr>
-            <a:endParaRPr lang="fr-FR" sz="2000" dirty="0"/>
-          </a:p>
-          <a:p>
-            <a:pPr marL="0" indent="0">
-              <a:buNone/>
-            </a:pPr>
-            <a:endParaRPr lang="fr-FR" sz="2000" dirty="0"/>
-          </a:p>
-          <a:p>
-            <a:pPr marL="0" indent="0">
-              <a:buNone/>
-            </a:pPr>
-            <a:r>
-              <a:rPr lang="fr-FR" sz="2000" dirty="0"/>
-              <a:t>Vous allez maintenant avoir plusieurs essais d’entrainement. </a:t>
-            </a:r>
-          </a:p>
-          <a:p>
-            <a:endParaRPr lang="fr-FR" sz="2000" dirty="0"/>
-          </a:p>
-          <a:p>
-            <a:pPr marL="0" indent="0">
-              <a:buNone/>
-            </a:pPr>
-            <a:endParaRPr lang="fr-FR" sz="2000" dirty="0"/>
-          </a:p>
-          <a:p>
-            <a:pPr marL="0" indent="0">
-              <a:buNone/>
-            </a:pPr>
-            <a:r>
-              <a:rPr lang="fr-FR" sz="2000" dirty="0"/>
-              <a:t>Votre performance dans cette phase ne sera pas prise en compte pour votre bonus financier. </a:t>
-            </a:r>
-          </a:p>
-          <a:p>
-            <a:pPr marL="0" indent="0">
-              <a:buNone/>
-            </a:pPr>
-            <a:endParaRPr lang="fr-FR" sz="2000" dirty="0"/>
-          </a:p>
-          <a:p>
-            <a:pPr marL="0" indent="0">
-              <a:buNone/>
-            </a:pPr>
-            <a:endParaRPr lang="fr-FR" sz="2000" dirty="0"/>
-          </a:p>
-          <a:p>
-            <a:pPr marL="0" indent="0">
-              <a:buNone/>
-            </a:pPr>
-            <a:r>
-              <a:rPr lang="fr-FR" sz="2000" dirty="0"/>
-              <a:t>Rappelez-vous d’utiliser la touche [O] pour répondre « Oui » et la touche [N] pour répondre « Non ». </a:t>
-            </a:r>
-          </a:p>
-          <a:p>
-            <a:endParaRPr lang="fr-FR" dirty="0"/>
-          </a:p>
-        </p:txBody>
-      </p:sp>
-      <p:sp>
-        <p:nvSpPr>
-          <p:cNvPr id="4" name="Rectangle 3"/>
-          <p:cNvSpPr/>
-          <p:nvPr/>
-        </p:nvSpPr>
-        <p:spPr>
-          <a:xfrm>
-            <a:off x="4121486" y="6369919"/>
-            <a:ext cx="3949030" cy="400110"/>
-          </a:xfrm>
-          <a:prstGeom prst="rect">
-            <a:avLst/>
-          </a:prstGeom>
-        </p:spPr>
-        <p:txBody>
-          <a:bodyPr wrap="none">
-            <a:spAutoFit/>
-          </a:bodyPr>
-          <a:lstStyle/>
-          <a:p>
-            <a:r>
-              <a:rPr lang="fr-FR" sz="2000" i="1" dirty="0">
-                <a:solidFill>
-                  <a:schemeClr val="tx1">
-                    <a:lumMod val="50000"/>
-                    <a:lumOff val="50000"/>
-                  </a:schemeClr>
-                </a:solidFill>
-              </a:rPr>
-              <a:t>Appuyez sur [espace] pour continuer</a:t>
-            </a:r>
-          </a:p>
-        </p:txBody>
-      </p:sp>
-    </p:spTree>
-    <p:extLst>
-      <p:ext uri="{BB962C8B-B14F-4D97-AF65-F5344CB8AC3E}">
-        <p14:creationId xmlns:p14="http://schemas.microsoft.com/office/powerpoint/2010/main" val="2071561818"/>
-      </p:ext>
-    </p:extLst>
-  </p:cSld>
-  <p:clrMapOvr>
-    <a:masterClrMapping/>
-  </p:clrMapOvr>
-</p:sld>
-</file>
-
-<file path=ppt/slides/slide11.xml><?xml version="1.0" encoding="utf-8"?>
-<p:sld xmlns:a="http://schemas.openxmlformats.org/drawingml/2006/main" xmlns:r="http://schemas.openxmlformats.org/officeDocument/2006/relationships" xmlns:p="http://schemas.openxmlformats.org/presentationml/2006/main">
-  <p:cSld>
-    <p:spTree>
-      <p:nvGrpSpPr>
-        <p:cNvPr id="1" name=""/>
-        <p:cNvGrpSpPr/>
-        <p:nvPr/>
-      </p:nvGrpSpPr>
-      <p:grpSpPr>
-        <a:xfrm>
-          <a:off x="0" y="0"/>
-          <a:ext cx="0" cy="0"/>
-          <a:chOff x="0" y="0"/>
-          <a:chExt cx="0" cy="0"/>
-        </a:xfrm>
-      </p:grpSpPr>
-      <p:sp>
-        <p:nvSpPr>
-          <p:cNvPr id="2" name="Titre 1"/>
-          <p:cNvSpPr>
-            <a:spLocks noGrp="1"/>
-          </p:cNvSpPr>
-          <p:nvPr>
-            <p:ph type="title"/>
-          </p:nvPr>
-        </p:nvSpPr>
-        <p:spPr/>
-        <p:txBody>
-          <a:bodyPr/>
-          <a:lstStyle/>
-          <a:p>
-            <a:r>
-              <a:rPr lang="fr-FR" dirty="0"/>
-              <a:t>Fin entrainement pour le </a:t>
-            </a:r>
-            <a:r>
-              <a:rPr lang="fr-FR" i="1" dirty="0"/>
-              <a:t>jeu de détection</a:t>
-            </a:r>
-            <a:endParaRPr lang="fr-FR" dirty="0"/>
-          </a:p>
-        </p:txBody>
-      </p:sp>
-      <p:sp>
-        <p:nvSpPr>
-          <p:cNvPr id="5" name="Espace réservé du contenu 4"/>
-          <p:cNvSpPr>
-            <a:spLocks noGrp="1"/>
-          </p:cNvSpPr>
-          <p:nvPr>
-            <p:ph idx="1"/>
-          </p:nvPr>
-        </p:nvSpPr>
-        <p:spPr>
-          <a:xfrm>
-            <a:off x="838200" y="1825625"/>
-            <a:ext cx="10608425" cy="4351338"/>
-          </a:xfrm>
-        </p:spPr>
-        <p:txBody>
-          <a:bodyPr/>
-          <a:lstStyle/>
-          <a:p>
-            <a:pPr marL="0" indent="0">
-              <a:buNone/>
-            </a:pPr>
-            <a:endParaRPr lang="fr-FR" sz="2000" dirty="0"/>
-          </a:p>
-          <a:p>
-            <a:pPr marL="0" indent="0">
-              <a:buNone/>
-            </a:pPr>
-            <a:endParaRPr lang="fr-FR" sz="2000" dirty="0"/>
-          </a:p>
-          <a:p>
-            <a:pPr marL="0" indent="0">
-              <a:buNone/>
-            </a:pPr>
-            <a:r>
-              <a:rPr lang="fr-FR" sz="2000" dirty="0"/>
-              <a:t>L’entrainement du </a:t>
-            </a:r>
-            <a:r>
-              <a:rPr lang="fr-FR" sz="2000" i="1" dirty="0"/>
-              <a:t>jeu de détection </a:t>
-            </a:r>
-            <a:r>
-              <a:rPr lang="fr-FR" sz="2000" dirty="0"/>
-              <a:t>est terminé.  Vous allez maintenant commencer le jeu. </a:t>
-            </a:r>
-          </a:p>
-          <a:p>
-            <a:pPr marL="0" indent="0">
-              <a:buNone/>
-            </a:pPr>
-            <a:endParaRPr lang="fr-FR" sz="2000" dirty="0"/>
-          </a:p>
-          <a:p>
-            <a:pPr marL="0" indent="0">
-              <a:buNone/>
-            </a:pPr>
-            <a:endParaRPr lang="fr-FR" sz="2000" dirty="0"/>
-          </a:p>
-          <a:p>
-            <a:pPr marL="0" indent="0">
-              <a:buNone/>
-            </a:pPr>
-            <a:r>
-              <a:rPr lang="fr-FR" sz="2000" dirty="0"/>
-              <a:t>Votre performance dans cette phase sera prise en compte pour votre bonus financier. </a:t>
-            </a:r>
-          </a:p>
-          <a:p>
-            <a:pPr marL="0" indent="0">
-              <a:buNone/>
-            </a:pPr>
-            <a:endParaRPr lang="fr-FR" sz="2000" dirty="0"/>
-          </a:p>
-          <a:p>
-            <a:pPr marL="0" indent="0">
-              <a:buNone/>
-            </a:pPr>
-            <a:endParaRPr lang="fr-FR" sz="2000" dirty="0"/>
-          </a:p>
-          <a:p>
-            <a:pPr marL="0" indent="0">
-              <a:buNone/>
-            </a:pPr>
-            <a:r>
-              <a:rPr lang="fr-FR" sz="2000" dirty="0"/>
-              <a:t>Rappelez-vous d’utiliser la touche [O] pour répondre « Oui » et la touche [N] pour répondre « Non ». </a:t>
-            </a:r>
-          </a:p>
-          <a:p>
-            <a:pPr marL="0" indent="0">
-              <a:buNone/>
-            </a:pPr>
-            <a:endParaRPr lang="fr-FR" sz="2000" dirty="0"/>
-          </a:p>
-          <a:p>
-            <a:pPr marL="0" indent="0">
-              <a:buNone/>
-            </a:pPr>
-            <a:endParaRPr lang="fr-FR" sz="2000" dirty="0"/>
-          </a:p>
-          <a:p>
-            <a:pPr marL="0" indent="0">
-              <a:buNone/>
-            </a:pPr>
-            <a:endParaRPr lang="fr-FR" sz="2000" dirty="0"/>
-          </a:p>
-          <a:p>
-            <a:pPr marL="0" indent="0">
-              <a:buNone/>
-            </a:pPr>
-            <a:endParaRPr lang="fr-FR" dirty="0"/>
-          </a:p>
-        </p:txBody>
-      </p:sp>
-      <p:sp>
-        <p:nvSpPr>
-          <p:cNvPr id="4" name="Rectangle 3"/>
-          <p:cNvSpPr/>
-          <p:nvPr/>
-        </p:nvSpPr>
-        <p:spPr>
-          <a:xfrm>
-            <a:off x="4121486" y="6369919"/>
-            <a:ext cx="3949030" cy="400110"/>
-          </a:xfrm>
-          <a:prstGeom prst="rect">
-            <a:avLst/>
-          </a:prstGeom>
-        </p:spPr>
-        <p:txBody>
-          <a:bodyPr wrap="none">
-            <a:spAutoFit/>
-          </a:bodyPr>
-          <a:lstStyle/>
-          <a:p>
-            <a:r>
-              <a:rPr lang="fr-FR" sz="2000" i="1" dirty="0">
-                <a:solidFill>
-                  <a:schemeClr val="tx1">
-                    <a:lumMod val="50000"/>
-                    <a:lumOff val="50000"/>
-                  </a:schemeClr>
-                </a:solidFill>
-              </a:rPr>
-              <a:t>Appuyez sur [espace] pour continuer</a:t>
-            </a:r>
-          </a:p>
-        </p:txBody>
-      </p:sp>
-    </p:spTree>
-    <p:extLst>
-      <p:ext uri="{BB962C8B-B14F-4D97-AF65-F5344CB8AC3E}">
-        <p14:creationId xmlns:p14="http://schemas.microsoft.com/office/powerpoint/2010/main" val="3249193195"/>
-      </p:ext>
-    </p:extLst>
-  </p:cSld>
-  <p:clrMapOvr>
-    <a:masterClrMapping/>
-  </p:clrMapOvr>
-</p:sld>
-</file>
-
-<file path=ppt/slides/slide12.xml><?xml version="1.0" encoding="utf-8"?>
-<p:sld xmlns:a="http://schemas.openxmlformats.org/drawingml/2006/main" xmlns:r="http://schemas.openxmlformats.org/officeDocument/2006/relationships" xmlns:p="http://schemas.openxmlformats.org/presentationml/2006/main">
-  <p:cSld>
-    <p:spTree>
-      <p:nvGrpSpPr>
-        <p:cNvPr id="1" name=""/>
-        <p:cNvGrpSpPr/>
-        <p:nvPr/>
-      </p:nvGrpSpPr>
-      <p:grpSpPr>
-        <a:xfrm>
-          <a:off x="0" y="0"/>
-          <a:ext cx="0" cy="0"/>
-          <a:chOff x="0" y="0"/>
-          <a:chExt cx="0" cy="0"/>
-        </a:xfrm>
-      </p:grpSpPr>
-      <p:sp>
-        <p:nvSpPr>
-          <p:cNvPr id="2" name="Titre 1"/>
-          <p:cNvSpPr>
-            <a:spLocks noGrp="1"/>
-          </p:cNvSpPr>
-          <p:nvPr>
-            <p:ph type="title"/>
-          </p:nvPr>
-        </p:nvSpPr>
-        <p:spPr/>
-        <p:txBody>
-          <a:bodyPr/>
-          <a:lstStyle/>
-          <a:p>
-            <a:r>
-              <a:rPr lang="fr-FR" i="1" dirty="0"/>
-              <a:t>Le</a:t>
-            </a:r>
-            <a:r>
-              <a:rPr lang="fr-FR" dirty="0"/>
-              <a:t> </a:t>
-            </a:r>
-            <a:r>
-              <a:rPr lang="fr-FR" i="1" dirty="0"/>
-              <a:t>jeu de discrimination</a:t>
-            </a:r>
-            <a:endParaRPr lang="fr-FR" dirty="0"/>
-          </a:p>
-        </p:txBody>
-      </p:sp>
-      <p:sp>
-        <p:nvSpPr>
-          <p:cNvPr id="5" name="Espace réservé du contenu 4"/>
-          <p:cNvSpPr>
-            <a:spLocks noGrp="1"/>
-          </p:cNvSpPr>
-          <p:nvPr>
-            <p:ph idx="1"/>
-          </p:nvPr>
-        </p:nvSpPr>
-        <p:spPr>
-          <a:xfrm>
-            <a:off x="838200" y="1825625"/>
-            <a:ext cx="10608425" cy="4351338"/>
-          </a:xfrm>
-        </p:spPr>
-        <p:txBody>
-          <a:bodyPr/>
-          <a:lstStyle/>
-          <a:p>
-            <a:pPr marL="0" indent="0">
-              <a:buNone/>
-            </a:pPr>
-            <a:endParaRPr lang="fr-FR" sz="2000" dirty="0"/>
-          </a:p>
-          <a:p>
-            <a:pPr marL="0" indent="0">
-              <a:buNone/>
-            </a:pPr>
-            <a:endParaRPr lang="fr-FR" sz="2000" dirty="0"/>
-          </a:p>
-          <a:p>
-            <a:pPr marL="0" indent="0">
-              <a:buNone/>
-            </a:pPr>
-            <a:r>
-              <a:rPr lang="fr-FR" sz="2000" dirty="0"/>
-              <a:t>Vous allez maintenant commencer le jeu. </a:t>
-            </a:r>
-          </a:p>
-          <a:p>
-            <a:endParaRPr lang="fr-FR" sz="2000" dirty="0"/>
-          </a:p>
-          <a:p>
-            <a:pPr marL="0" indent="0">
-              <a:buNone/>
-            </a:pPr>
-            <a:endParaRPr lang="fr-FR" sz="2000" dirty="0"/>
-          </a:p>
-          <a:p>
-            <a:pPr marL="0" indent="0">
-              <a:buNone/>
-            </a:pPr>
-            <a:r>
-              <a:rPr lang="fr-FR" sz="2000" dirty="0"/>
-              <a:t>Rappelez-vous d’utiliser la touche [O] pour répondre « Oui » et la touche [N] pour répondre « Non ». </a:t>
-            </a:r>
-          </a:p>
-          <a:p>
-            <a:endParaRPr lang="fr-FR" dirty="0"/>
-          </a:p>
-        </p:txBody>
-      </p:sp>
-      <p:sp>
-        <p:nvSpPr>
-          <p:cNvPr id="4" name="Rectangle 3"/>
-          <p:cNvSpPr/>
-          <p:nvPr/>
-        </p:nvSpPr>
-        <p:spPr>
-          <a:xfrm>
-            <a:off x="4121486" y="6369919"/>
-            <a:ext cx="3949030" cy="400110"/>
-          </a:xfrm>
-          <a:prstGeom prst="rect">
-            <a:avLst/>
-          </a:prstGeom>
-        </p:spPr>
-        <p:txBody>
-          <a:bodyPr wrap="none">
-            <a:spAutoFit/>
-          </a:bodyPr>
-          <a:lstStyle/>
-          <a:p>
-            <a:r>
-              <a:rPr lang="fr-FR" sz="2000" i="1" dirty="0">
-                <a:solidFill>
-                  <a:schemeClr val="tx1">
-                    <a:lumMod val="50000"/>
-                    <a:lumOff val="50000"/>
-                  </a:schemeClr>
-                </a:solidFill>
-              </a:rPr>
-              <a:t>Appuyez sur [espace] pour continuer</a:t>
-            </a:r>
-          </a:p>
-        </p:txBody>
-      </p:sp>
-    </p:spTree>
-    <p:extLst>
-      <p:ext uri="{BB962C8B-B14F-4D97-AF65-F5344CB8AC3E}">
-        <p14:creationId xmlns:p14="http://schemas.microsoft.com/office/powerpoint/2010/main" val="1515506491"/>
-      </p:ext>
-    </p:extLst>
-  </p:cSld>
-  <p:clrMapOvr>
-    <a:masterClrMapping/>
-  </p:clrMapOvr>
-</p:sld>
-</file>
-
-<file path=ppt/slides/slide13.xml><?xml version="1.0" encoding="utf-8"?>
-<p:sld xmlns:a="http://schemas.openxmlformats.org/drawingml/2006/main" xmlns:r="http://schemas.openxmlformats.org/officeDocument/2006/relationships" xmlns:p="http://schemas.openxmlformats.org/presentationml/2006/main">
-  <p:cSld>
-    <p:spTree>
-      <p:nvGrpSpPr>
-        <p:cNvPr id="1" name=""/>
-        <p:cNvGrpSpPr/>
-        <p:nvPr/>
-      </p:nvGrpSpPr>
-      <p:grpSpPr>
-        <a:xfrm>
-          <a:off x="0" y="0"/>
-          <a:ext cx="0" cy="0"/>
-          <a:chOff x="0" y="0"/>
-          <a:chExt cx="0" cy="0"/>
-        </a:xfrm>
-      </p:grpSpPr>
-      <p:sp>
-        <p:nvSpPr>
-          <p:cNvPr id="2" name="Titre 1"/>
-          <p:cNvSpPr>
-            <a:spLocks noGrp="1"/>
-          </p:cNvSpPr>
-          <p:nvPr>
-            <p:ph type="title"/>
-          </p:nvPr>
-        </p:nvSpPr>
-        <p:spPr>
-          <a:xfrm>
-            <a:off x="2591147" y="2364012"/>
-            <a:ext cx="7009707" cy="2129977"/>
-          </a:xfrm>
-        </p:spPr>
-        <p:txBody>
-          <a:bodyPr>
-            <a:normAutofit/>
-          </a:bodyPr>
-          <a:lstStyle/>
-          <a:p>
-            <a:pPr algn="ctr"/>
-            <a:r>
-              <a:rPr lang="fr-FR" dirty="0"/>
-              <a:t>L’expérience est terminée.</a:t>
-            </a:r>
-            <a:br>
-              <a:rPr lang="fr-FR" dirty="0"/>
-            </a:br>
-            <a:r>
-              <a:rPr lang="fr-FR" dirty="0"/>
-              <a:t> </a:t>
-            </a:r>
-            <a:br>
-              <a:rPr lang="fr-FR" dirty="0"/>
-            </a:br>
-            <a:r>
-              <a:rPr lang="fr-FR" dirty="0"/>
-              <a:t>Merci d’avoir participé.</a:t>
-            </a:r>
-          </a:p>
-        </p:txBody>
-      </p:sp>
-      <p:sp>
-        <p:nvSpPr>
-          <p:cNvPr id="4" name="Rectangle 3"/>
-          <p:cNvSpPr/>
-          <p:nvPr/>
-        </p:nvSpPr>
-        <p:spPr>
-          <a:xfrm>
-            <a:off x="4376460" y="6369919"/>
-            <a:ext cx="3381375" cy="400110"/>
-          </a:xfrm>
-          <a:prstGeom prst="rect">
-            <a:avLst/>
-          </a:prstGeom>
-        </p:spPr>
-        <p:txBody>
-          <a:bodyPr wrap="none">
-            <a:spAutoFit/>
-          </a:bodyPr>
-          <a:lstStyle/>
-          <a:p>
-            <a:r>
-              <a:rPr lang="fr-FR" sz="2000" i="1" dirty="0">
-                <a:solidFill>
-                  <a:schemeClr val="tx1">
-                    <a:lumMod val="50000"/>
-                    <a:lumOff val="50000"/>
-                  </a:schemeClr>
-                </a:solidFill>
-              </a:rPr>
-              <a:t>Appuyez sur [espace] pour finir</a:t>
-            </a:r>
-          </a:p>
-        </p:txBody>
-      </p:sp>
-    </p:spTree>
-    <p:extLst>
-      <p:ext uri="{BB962C8B-B14F-4D97-AF65-F5344CB8AC3E}">
-        <p14:creationId xmlns:p14="http://schemas.microsoft.com/office/powerpoint/2010/main" val="255671310"/>
-      </p:ext>
-    </p:extLst>
-  </p:cSld>
-  <p:clrMapOvr>
-    <a:masterClrMapping/>
-  </p:clrMapOvr>
-</p:sld>
-</file>
-
-<file path=ppt/slides/slide2.xml><?xml version="1.0" encoding="utf-8"?>
-<p:sld xmlns:a="http://schemas.openxmlformats.org/drawingml/2006/main" xmlns:r="http://schemas.openxmlformats.org/officeDocument/2006/relationships" xmlns:p="http://schemas.openxmlformats.org/presentationml/2006/main">
-  <p:cSld>
-    <p:spTree>
-      <p:nvGrpSpPr>
-        <p:cNvPr id="1" name=""/>
-        <p:cNvGrpSpPr/>
-        <p:nvPr/>
-      </p:nvGrpSpPr>
-      <p:grpSpPr>
-        <a:xfrm>
-          <a:off x="0" y="0"/>
-          <a:ext cx="0" cy="0"/>
-          <a:chOff x="0" y="0"/>
-          <a:chExt cx="0" cy="0"/>
-        </a:xfrm>
-      </p:grpSpPr>
-      <p:sp>
-        <p:nvSpPr>
-          <p:cNvPr id="3" name="Espace réservé du contenu 2"/>
-          <p:cNvSpPr>
-            <a:spLocks noGrp="1"/>
-          </p:cNvSpPr>
-          <p:nvPr>
-            <p:ph idx="1"/>
-          </p:nvPr>
-        </p:nvSpPr>
-        <p:spPr>
-          <a:xfrm>
-            <a:off x="838200" y="1271848"/>
-            <a:ext cx="10515600" cy="4314305"/>
-          </a:xfrm>
-        </p:spPr>
-        <p:txBody>
-          <a:bodyPr>
-            <a:normAutofit/>
-          </a:bodyPr>
-          <a:lstStyle/>
-          <a:p>
-            <a:pPr marL="0" indent="0" algn="just">
-              <a:buNone/>
-            </a:pPr>
-            <a:r>
-              <a:rPr lang="fr-FR" sz="2000" dirty="0"/>
-              <a:t>Vous allez jouer à un jeux qui dure environ </a:t>
-            </a:r>
-            <a:r>
-              <a:rPr lang="fr-FR" sz="2000" dirty="0">
-                <a:solidFill>
-                  <a:srgbClr val="FF0000"/>
-                </a:solidFill>
-              </a:rPr>
-              <a:t>20 minutes</a:t>
-            </a:r>
-            <a:r>
-              <a:rPr lang="fr-FR" sz="2000" dirty="0"/>
-              <a:t>. </a:t>
-            </a:r>
-          </a:p>
-          <a:p>
-            <a:pPr marL="0" indent="0" algn="just">
-              <a:buNone/>
-            </a:pPr>
-            <a:endParaRPr lang="fr-FR" sz="2000" dirty="0"/>
-          </a:p>
-          <a:p>
-            <a:pPr marL="0" indent="0" algn="just">
-              <a:buNone/>
-            </a:pPr>
-            <a:r>
-              <a:rPr lang="fr-FR" sz="2000" dirty="0"/>
-              <a:t>Le jeu est divisé </a:t>
-            </a:r>
-            <a:r>
-              <a:rPr lang="fr-FR" sz="2000" dirty="0">
-                <a:solidFill>
-                  <a:srgbClr val="FF0000"/>
-                </a:solidFill>
-              </a:rPr>
-              <a:t>en 200 "essais", </a:t>
-            </a:r>
-            <a:r>
-              <a:rPr lang="fr-FR" sz="2000" dirty="0"/>
-              <a:t>qui rapportent plus ou moins d'argent. Par exemple, il y a des essais pour lesquels une réponse correcte rapporte </a:t>
-            </a:r>
-            <a:r>
-              <a:rPr lang="fr-FR" sz="2000" dirty="0">
-                <a:solidFill>
-                  <a:srgbClr val="FF0000"/>
-                </a:solidFill>
-              </a:rPr>
-              <a:t>5 centimes </a:t>
-            </a:r>
-            <a:r>
-              <a:rPr lang="fr-FR" sz="2000" dirty="0"/>
-              <a:t>et d’autres pour lesquels une réponse correcte rapporte </a:t>
-            </a:r>
-            <a:r>
-              <a:rPr lang="fr-FR" sz="2000" dirty="0">
-                <a:solidFill>
-                  <a:srgbClr val="FF0000"/>
-                </a:solidFill>
-              </a:rPr>
-              <a:t>2 euros</a:t>
-            </a:r>
-            <a:r>
-              <a:rPr lang="fr-FR" sz="2000" dirty="0"/>
-              <a:t>. Nous vous indiquerons, à chaque essai, quelle est la récompense en jeu.</a:t>
-            </a:r>
-          </a:p>
-          <a:p>
-            <a:pPr marL="0" indent="0" algn="just">
-              <a:buNone/>
-            </a:pPr>
-            <a:endParaRPr lang="fr-FR" sz="2000" dirty="0"/>
-          </a:p>
-          <a:p>
-            <a:pPr marL="0" indent="0" algn="just">
-              <a:buNone/>
-            </a:pPr>
-            <a:r>
-              <a:rPr lang="fr-FR" sz="2000" dirty="0"/>
-              <a:t>Note: vous recevrez une indemnisation financière de </a:t>
-            </a:r>
-            <a:r>
-              <a:rPr lang="fr-FR" sz="2000" dirty="0">
-                <a:solidFill>
-                  <a:srgbClr val="FF0000"/>
-                </a:solidFill>
-              </a:rPr>
-              <a:t>X€ </a:t>
-            </a:r>
-            <a:r>
-              <a:rPr lang="fr-FR" sz="2000" dirty="0"/>
-              <a:t>pour avoir participé à l'expérience, quelle que soit votre performance. Cela dit, vous recevrez un bonus financier proportionnel à votre performance. En effet, à la fin de l'expérience, nous sélectionnerons </a:t>
-            </a:r>
-            <a:r>
-              <a:rPr lang="fr-FR" sz="2000" dirty="0">
-                <a:solidFill>
-                  <a:srgbClr val="FF0000"/>
-                </a:solidFill>
-              </a:rPr>
-              <a:t>10 essais </a:t>
-            </a:r>
-            <a:r>
-              <a:rPr lang="fr-FR" sz="2000" dirty="0"/>
-              <a:t>de chaque jeu au hasard, et vous recevrez la somme d'argent qui leur correspond (2 euros ou 5 centimes si vous avez répondu correctement, rien sinon).</a:t>
-            </a:r>
-          </a:p>
-          <a:p>
-            <a:endParaRPr lang="fr-FR" dirty="0"/>
-          </a:p>
-        </p:txBody>
-      </p:sp>
-      <p:sp>
-        <p:nvSpPr>
-          <p:cNvPr id="4" name="Rectangle 3"/>
-          <p:cNvSpPr/>
-          <p:nvPr/>
-        </p:nvSpPr>
-        <p:spPr>
-          <a:xfrm>
-            <a:off x="4121486" y="6369919"/>
-            <a:ext cx="3949030" cy="400110"/>
-          </a:xfrm>
-          <a:prstGeom prst="rect">
-            <a:avLst/>
-          </a:prstGeom>
-        </p:spPr>
-        <p:txBody>
-          <a:bodyPr wrap="none">
-            <a:spAutoFit/>
-          </a:bodyPr>
-          <a:lstStyle/>
-          <a:p>
-            <a:r>
-              <a:rPr lang="fr-FR" sz="2000" i="1" dirty="0">
-                <a:solidFill>
-                  <a:schemeClr val="tx1">
-                    <a:lumMod val="50000"/>
-                    <a:lumOff val="50000"/>
-                  </a:schemeClr>
-                </a:solidFill>
-              </a:rPr>
-              <a:t>Appuyez sur [espace] pour continuer</a:t>
-            </a:r>
-          </a:p>
-        </p:txBody>
-      </p:sp>
-    </p:spTree>
-    <p:extLst>
-      <p:ext uri="{BB962C8B-B14F-4D97-AF65-F5344CB8AC3E}">
-        <p14:creationId xmlns:p14="http://schemas.microsoft.com/office/powerpoint/2010/main" val="4012922657"/>
-      </p:ext>
-    </p:extLst>
-  </p:cSld>
-  <p:clrMapOvr>
-    <a:masterClrMapping/>
-  </p:clrMapOvr>
-</p:sld>
-</file>
-
-<file path=ppt/slides/slide3.xml><?xml version="1.0" encoding="utf-8"?>
-<p:sld xmlns:a="http://schemas.openxmlformats.org/drawingml/2006/main" xmlns:r="http://schemas.openxmlformats.org/officeDocument/2006/relationships" xmlns:p="http://schemas.openxmlformats.org/presentationml/2006/main">
-  <p:cSld>
-    <p:spTree>
-      <p:nvGrpSpPr>
-        <p:cNvPr id="1" name=""/>
-        <p:cNvGrpSpPr/>
-        <p:nvPr/>
-      </p:nvGrpSpPr>
-      <p:grpSpPr>
-        <a:xfrm>
-          <a:off x="0" y="0"/>
-          <a:ext cx="0" cy="0"/>
-          <a:chOff x="0" y="0"/>
-          <a:chExt cx="0" cy="0"/>
-        </a:xfrm>
-      </p:grpSpPr>
-      <p:pic>
-        <p:nvPicPr>
-          <p:cNvPr id="7" name="Picture 6" descr="A close up of a device&#10;&#10;Description automatically generated">
-            <a:extLst>
-              <a:ext uri="{FF2B5EF4-FFF2-40B4-BE49-F238E27FC236}">
-                <a16:creationId xmlns:a16="http://schemas.microsoft.com/office/drawing/2014/main" id="{D0732A4D-E3B0-48A9-97C2-445083C561E8}"/>
-              </a:ext>
-            </a:extLst>
-          </p:cNvPr>
-          <p:cNvPicPr>
-            <a:picLocks noChangeAspect="1"/>
-          </p:cNvPicPr>
-          <p:nvPr/>
-        </p:nvPicPr>
-        <p:blipFill>
-          <a:blip r:embed="rId2">
-            <a:extLst>
-              <a:ext uri="{28A0092B-C50C-407E-A947-70E740481C1C}">
-                <a14:useLocalDpi xmlns:a14="http://schemas.microsoft.com/office/drawing/2010/main" val="0"/>
-              </a:ext>
-            </a:extLst>
-          </a:blip>
-          <a:stretch>
-            <a:fillRect/>
-          </a:stretch>
-        </p:blipFill>
-        <p:spPr>
-          <a:xfrm>
-            <a:off x="0" y="0"/>
-            <a:ext cx="12192000" cy="6858000"/>
-          </a:xfrm>
-          <a:prstGeom prst="rect">
-            <a:avLst/>
-          </a:prstGeom>
-        </p:spPr>
-      </p:pic>
-    </p:spTree>
-    <p:extLst>
-      <p:ext uri="{BB962C8B-B14F-4D97-AF65-F5344CB8AC3E}">
-        <p14:creationId xmlns:p14="http://schemas.microsoft.com/office/powerpoint/2010/main" val="3300649912"/>
-      </p:ext>
-    </p:extLst>
-  </p:cSld>
-  <p:clrMapOvr>
-    <a:masterClrMapping/>
-  </p:clrMapOvr>
-</p:sld>
-</file>
-
-<file path=ppt/slides/slide4.xml><?xml version="1.0" encoding="utf-8"?>
-<p:sld xmlns:a="http://schemas.openxmlformats.org/drawingml/2006/main" xmlns:r="http://schemas.openxmlformats.org/officeDocument/2006/relationships" xmlns:p="http://schemas.openxmlformats.org/presentationml/2006/main">
-  <p:cSld>
-    <p:spTree>
-      <p:nvGrpSpPr>
-        <p:cNvPr id="1" name=""/>
-        <p:cNvGrpSpPr/>
-        <p:nvPr/>
-      </p:nvGrpSpPr>
-      <p:grpSpPr>
-        <a:xfrm>
-          <a:off x="0" y="0"/>
-          <a:ext cx="0" cy="0"/>
-          <a:chOff x="0" y="0"/>
-          <a:chExt cx="0" cy="0"/>
-        </a:xfrm>
-      </p:grpSpPr>
-      <p:pic>
-        <p:nvPicPr>
-          <p:cNvPr id="8" name="Picture 7" descr="A picture containing bird, flower, tree&#10;&#10;Description automatically generated">
-            <a:extLst>
-              <a:ext uri="{FF2B5EF4-FFF2-40B4-BE49-F238E27FC236}">
-                <a16:creationId xmlns:a16="http://schemas.microsoft.com/office/drawing/2014/main" id="{54C1346C-62A8-4C20-A0C4-EA84DEF33AAD}"/>
-              </a:ext>
-            </a:extLst>
-          </p:cNvPr>
-          <p:cNvPicPr>
-            <a:picLocks noChangeAspect="1"/>
-          </p:cNvPicPr>
-          <p:nvPr/>
-        </p:nvPicPr>
-        <p:blipFill>
-          <a:blip r:embed="rId2">
-            <a:extLst>
-              <a:ext uri="{28A0092B-C50C-407E-A947-70E740481C1C}">
-                <a14:useLocalDpi xmlns:a14="http://schemas.microsoft.com/office/drawing/2010/main" val="0"/>
-              </a:ext>
-            </a:extLst>
-          </a:blip>
-          <a:stretch>
-            <a:fillRect/>
-          </a:stretch>
-        </p:blipFill>
-        <p:spPr>
-          <a:xfrm>
-            <a:off x="0" y="0"/>
-            <a:ext cx="12192000" cy="6858000"/>
-          </a:xfrm>
-          <a:prstGeom prst="rect">
-            <a:avLst/>
-          </a:prstGeom>
-        </p:spPr>
-      </p:pic>
-    </p:spTree>
-    <p:extLst>
-      <p:ext uri="{BB962C8B-B14F-4D97-AF65-F5344CB8AC3E}">
-        <p14:creationId xmlns:p14="http://schemas.microsoft.com/office/powerpoint/2010/main" val="885274509"/>
-      </p:ext>
-    </p:extLst>
-  </p:cSld>
-  <p:clrMapOvr>
-    <a:masterClrMapping/>
-  </p:clrMapOvr>
-</p:sld>
-</file>
-
-<file path=ppt/slides/slide5.xml><?xml version="1.0" encoding="utf-8"?>
-<p:sld xmlns:a="http://schemas.openxmlformats.org/drawingml/2006/main" xmlns:r="http://schemas.openxmlformats.org/officeDocument/2006/relationships" xmlns:p="http://schemas.openxmlformats.org/presentationml/2006/main">
-  <p:cSld>
-    <p:spTree>
-      <p:nvGrpSpPr>
-        <p:cNvPr id="1" name=""/>
-        <p:cNvGrpSpPr/>
-        <p:nvPr/>
-      </p:nvGrpSpPr>
-      <p:grpSpPr>
-        <a:xfrm>
-          <a:off x="0" y="0"/>
-          <a:ext cx="0" cy="0"/>
-          <a:chOff x="0" y="0"/>
-          <a:chExt cx="0" cy="0"/>
-        </a:xfrm>
-      </p:grpSpPr>
-      <p:pic>
-        <p:nvPicPr>
-          <p:cNvPr id="3" name="Picture 2" descr="A picture containing flower, bird, tree&#10;&#10;Description automatically generated">
-            <a:extLst>
-              <a:ext uri="{FF2B5EF4-FFF2-40B4-BE49-F238E27FC236}">
-                <a16:creationId xmlns:a16="http://schemas.microsoft.com/office/drawing/2014/main" id="{CA35783B-E1D8-412C-93DF-B1AEA0AC50A8}"/>
-              </a:ext>
-            </a:extLst>
-          </p:cNvPr>
-          <p:cNvPicPr>
-            <a:picLocks noChangeAspect="1"/>
-          </p:cNvPicPr>
-          <p:nvPr/>
-        </p:nvPicPr>
-        <p:blipFill>
-          <a:blip r:embed="rId2">
-            <a:extLst>
-              <a:ext uri="{28A0092B-C50C-407E-A947-70E740481C1C}">
-                <a14:useLocalDpi xmlns:a14="http://schemas.microsoft.com/office/drawing/2010/main" val="0"/>
-              </a:ext>
-            </a:extLst>
-          </a:blip>
-          <a:stretch>
-            <a:fillRect/>
-          </a:stretch>
-        </p:blipFill>
-        <p:spPr>
-          <a:xfrm>
-            <a:off x="0" y="0"/>
-            <a:ext cx="12192000" cy="6858000"/>
-          </a:xfrm>
-          <a:prstGeom prst="rect">
-            <a:avLst/>
-          </a:prstGeom>
-        </p:spPr>
-      </p:pic>
-    </p:spTree>
-    <p:extLst>
-      <p:ext uri="{BB962C8B-B14F-4D97-AF65-F5344CB8AC3E}">
-        <p14:creationId xmlns:p14="http://schemas.microsoft.com/office/powerpoint/2010/main" val="288640065"/>
-      </p:ext>
-    </p:extLst>
-  </p:cSld>
-  <p:clrMapOvr>
-    <a:masterClrMapping/>
-  </p:clrMapOvr>
-</p:sld>
-</file>
-
-<file path=ppt/slides/slide6.xml><?xml version="1.0" encoding="utf-8"?>
 <p:sld xmlns:a="http://schemas.openxmlformats.org/drawingml/2006/main" xmlns:r="http://schemas.openxmlformats.org/officeDocument/2006/relationships" xmlns:p="http://schemas.openxmlformats.org/presentationml/2006/main">
   <p:cSld>
     <p:spTree>
@@ -4369,10 +3419,17 @@
   <p:clrMapOvr>
     <a:masterClrMapping/>
   </p:clrMapOvr>
+  <p:timing>
+    <p:tnLst>
+      <p:par>
+        <p:cTn id="1" dur="indefinite" restart="never" nodeType="tmRoot"/>
+      </p:par>
+    </p:tnLst>
+  </p:timing>
 </p:sld>
 </file>
 
-<file path=ppt/slides/slide7.xml><?xml version="1.0" encoding="utf-8"?>
+<file path=ppt/slides/slide11.xml><?xml version="1.0" encoding="utf-8"?>
 <p:sld xmlns:a="http://schemas.openxmlformats.org/drawingml/2006/main" xmlns:r="http://schemas.openxmlformats.org/officeDocument/2006/relationships" xmlns:p="http://schemas.openxmlformats.org/presentationml/2006/main">
   <p:cSld>
     <p:spTree>
@@ -4435,10 +3492,363 @@
   <p:clrMapOvr>
     <a:masterClrMapping/>
   </p:clrMapOvr>
+  <p:timing>
+    <p:tnLst>
+      <p:par>
+        <p:cTn id="1" dur="indefinite" restart="never" nodeType="tmRoot"/>
+      </p:par>
+    </p:tnLst>
+  </p:timing>
 </p:sld>
 </file>
 
-<file path=ppt/slides/slide8.xml><?xml version="1.0" encoding="utf-8"?>
+<file path=ppt/slides/slide12.xml><?xml version="1.0" encoding="utf-8"?>
+<p:sld xmlns:a="http://schemas.openxmlformats.org/drawingml/2006/main" xmlns:r="http://schemas.openxmlformats.org/officeDocument/2006/relationships" xmlns:p="http://schemas.openxmlformats.org/presentationml/2006/main">
+  <p:cSld>
+    <p:spTree>
+      <p:nvGrpSpPr>
+        <p:cNvPr id="1" name=""/>
+        <p:cNvGrpSpPr/>
+        <p:nvPr/>
+      </p:nvGrpSpPr>
+      <p:grpSpPr>
+        <a:xfrm>
+          <a:off x="0" y="0"/>
+          <a:ext cx="0" cy="0"/>
+          <a:chOff x="0" y="0"/>
+          <a:chExt cx="0" cy="0"/>
+        </a:xfrm>
+      </p:grpSpPr>
+      <p:sp>
+        <p:nvSpPr>
+          <p:cNvPr id="2" name="Titre 1"/>
+          <p:cNvSpPr>
+            <a:spLocks noGrp="1"/>
+          </p:cNvSpPr>
+          <p:nvPr>
+            <p:ph type="title"/>
+          </p:nvPr>
+        </p:nvSpPr>
+        <p:spPr>
+          <a:xfrm>
+            <a:off x="2591147" y="2364012"/>
+            <a:ext cx="7009707" cy="2129977"/>
+          </a:xfrm>
+        </p:spPr>
+        <p:txBody>
+          <a:bodyPr>
+            <a:normAutofit fontScale="90000"/>
+          </a:bodyPr>
+          <a:lstStyle/>
+          <a:p>
+            <a:pPr algn="ctr"/>
+            <a:r>
+              <a:rPr lang="fr-FR" strike="sngStrike" dirty="0"/>
+              <a:t>L’expérience </a:t>
+            </a:r>
+            <a:r>
+              <a:rPr lang="fr-FR" dirty="0"/>
+              <a:t> </a:t>
+            </a:r>
+            <a:r>
+              <a:rPr lang="fr-FR" dirty="0" smtClean="0"/>
+              <a:t>C</a:t>
+            </a:r>
+            <a:r>
+              <a:rPr lang="fr-FR" dirty="0" smtClean="0"/>
+              <a:t>ette session est maintenant terminée</a:t>
+            </a:r>
+            <a:r>
+              <a:rPr lang="fr-FR" dirty="0"/>
+              <a:t>.</a:t>
+            </a:r>
+            <a:br>
+              <a:rPr lang="fr-FR" dirty="0"/>
+            </a:br>
+            <a:r>
+              <a:rPr lang="fr-FR" dirty="0"/>
+              <a:t> </a:t>
+            </a:r>
+            <a:br>
+              <a:rPr lang="fr-FR" dirty="0"/>
+            </a:br>
+            <a:r>
+              <a:rPr lang="fr-FR" dirty="0"/>
+              <a:t>Merci </a:t>
+            </a:r>
+            <a:r>
+              <a:rPr lang="fr-FR" dirty="0" smtClean="0"/>
+              <a:t>!</a:t>
+            </a:r>
+            <a:endParaRPr lang="fr-FR" dirty="0"/>
+          </a:p>
+        </p:txBody>
+      </p:sp>
+      <p:sp>
+        <p:nvSpPr>
+          <p:cNvPr id="4" name="Rectangle 3"/>
+          <p:cNvSpPr/>
+          <p:nvPr/>
+        </p:nvSpPr>
+        <p:spPr>
+          <a:xfrm>
+            <a:off x="4376460" y="6369919"/>
+            <a:ext cx="3381375" cy="400110"/>
+          </a:xfrm>
+          <a:prstGeom prst="rect">
+            <a:avLst/>
+          </a:prstGeom>
+        </p:spPr>
+        <p:txBody>
+          <a:bodyPr wrap="none">
+            <a:spAutoFit/>
+          </a:bodyPr>
+          <a:lstStyle/>
+          <a:p>
+            <a:r>
+              <a:rPr lang="fr-FR" sz="2000" i="1" dirty="0">
+                <a:solidFill>
+                  <a:schemeClr val="tx1">
+                    <a:lumMod val="50000"/>
+                    <a:lumOff val="50000"/>
+                  </a:schemeClr>
+                </a:solidFill>
+              </a:rPr>
+              <a:t>Appuyez sur [espace] pour finir</a:t>
+            </a:r>
+          </a:p>
+        </p:txBody>
+      </p:sp>
+    </p:spTree>
+    <p:extLst>
+      <p:ext uri="{BB962C8B-B14F-4D97-AF65-F5344CB8AC3E}">
+        <p14:creationId xmlns:p14="http://schemas.microsoft.com/office/powerpoint/2010/main" val="255671310"/>
+      </p:ext>
+    </p:extLst>
+  </p:cSld>
+  <p:clrMapOvr>
+    <a:masterClrMapping/>
+  </p:clrMapOvr>
+  <p:timing>
+    <p:tnLst>
+      <p:par>
+        <p:cTn id="1" dur="indefinite" restart="never" nodeType="tmRoot"/>
+      </p:par>
+    </p:tnLst>
+  </p:timing>
+</p:sld>
+</file>
+
+<file path=ppt/slides/slide2.xml><?xml version="1.0" encoding="utf-8"?>
+<p:sld xmlns:a="http://schemas.openxmlformats.org/drawingml/2006/main" xmlns:r="http://schemas.openxmlformats.org/officeDocument/2006/relationships" xmlns:p="http://schemas.openxmlformats.org/presentationml/2006/main">
+  <p:cSld>
+    <p:spTree>
+      <p:nvGrpSpPr>
+        <p:cNvPr id="1" name=""/>
+        <p:cNvGrpSpPr/>
+        <p:nvPr/>
+      </p:nvGrpSpPr>
+      <p:grpSpPr>
+        <a:xfrm>
+          <a:off x="0" y="0"/>
+          <a:ext cx="0" cy="0"/>
+          <a:chOff x="0" y="0"/>
+          <a:chExt cx="0" cy="0"/>
+        </a:xfrm>
+      </p:grpSpPr>
+      <p:sp>
+        <p:nvSpPr>
+          <p:cNvPr id="3" name="Espace réservé du contenu 2"/>
+          <p:cNvSpPr>
+            <a:spLocks noGrp="1"/>
+          </p:cNvSpPr>
+          <p:nvPr>
+            <p:ph idx="1"/>
+          </p:nvPr>
+        </p:nvSpPr>
+        <p:spPr>
+          <a:xfrm>
+            <a:off x="838200" y="1271848"/>
+            <a:ext cx="10515600" cy="4314305"/>
+          </a:xfrm>
+        </p:spPr>
+        <p:txBody>
+          <a:bodyPr>
+            <a:normAutofit/>
+          </a:bodyPr>
+          <a:lstStyle/>
+          <a:p>
+            <a:pPr marL="0" indent="0" algn="just">
+              <a:buNone/>
+            </a:pPr>
+            <a:r>
+              <a:rPr lang="fr-FR" sz="2000" dirty="0"/>
+              <a:t>Vous allez jouer à un jeux qui dure environ </a:t>
+            </a:r>
+            <a:r>
+              <a:rPr lang="fr-FR" sz="2000" dirty="0">
+                <a:solidFill>
+                  <a:srgbClr val="FF0000"/>
+                </a:solidFill>
+              </a:rPr>
+              <a:t>20 minutes</a:t>
+            </a:r>
+            <a:r>
+              <a:rPr lang="fr-FR" sz="2000" dirty="0"/>
+              <a:t>. </a:t>
+            </a:r>
+          </a:p>
+          <a:p>
+            <a:pPr marL="0" indent="0" algn="just">
+              <a:buNone/>
+            </a:pPr>
+            <a:endParaRPr lang="fr-FR" sz="2000" dirty="0"/>
+          </a:p>
+          <a:p>
+            <a:pPr marL="0" indent="0" algn="just">
+              <a:buNone/>
+            </a:pPr>
+            <a:r>
+              <a:rPr lang="fr-FR" sz="2000" dirty="0"/>
+              <a:t>Le jeu est divisé </a:t>
+            </a:r>
+            <a:r>
+              <a:rPr lang="fr-FR" sz="2000" dirty="0">
+                <a:solidFill>
+                  <a:srgbClr val="FF0000"/>
+                </a:solidFill>
+              </a:rPr>
+              <a:t>en 200 "essais", </a:t>
+            </a:r>
+            <a:r>
+              <a:rPr lang="fr-FR" sz="2000" dirty="0"/>
+              <a:t>qui rapportent plus ou moins d'argent. Par exemple, il y a des essais pour lesquels une réponse correcte rapporte </a:t>
+            </a:r>
+            <a:r>
+              <a:rPr lang="fr-FR" sz="2000" dirty="0">
+                <a:solidFill>
+                  <a:srgbClr val="FF0000"/>
+                </a:solidFill>
+              </a:rPr>
+              <a:t>5 centimes </a:t>
+            </a:r>
+            <a:r>
+              <a:rPr lang="fr-FR" sz="2000" dirty="0"/>
+              <a:t>et d’autres pour lesquels une réponse correcte rapporte </a:t>
+            </a:r>
+            <a:r>
+              <a:rPr lang="fr-FR" sz="2000" dirty="0">
+                <a:solidFill>
+                  <a:srgbClr val="FF0000"/>
+                </a:solidFill>
+              </a:rPr>
+              <a:t>2 euros</a:t>
+            </a:r>
+            <a:r>
+              <a:rPr lang="fr-FR" sz="2000" dirty="0"/>
+              <a:t>. Nous vous indiquerons, à chaque essai, quelle est la récompense en jeu.</a:t>
+            </a:r>
+          </a:p>
+          <a:p>
+            <a:pPr marL="0" indent="0" algn="just">
+              <a:buNone/>
+            </a:pPr>
+            <a:endParaRPr lang="fr-FR" sz="2000" dirty="0"/>
+          </a:p>
+          <a:p>
+            <a:pPr marL="0" indent="0" algn="just">
+              <a:buNone/>
+            </a:pPr>
+            <a:r>
+              <a:rPr lang="fr-FR" sz="2000" dirty="0"/>
+              <a:t>Note: vous recevrez une indemnisation financière de </a:t>
+            </a:r>
+            <a:r>
+              <a:rPr lang="fr-FR" sz="2000" dirty="0">
+                <a:solidFill>
+                  <a:srgbClr val="FF0000"/>
+                </a:solidFill>
+              </a:rPr>
+              <a:t>X€ </a:t>
+            </a:r>
+            <a:r>
+              <a:rPr lang="fr-FR" sz="2000" dirty="0"/>
+              <a:t>pour avoir participé à l'expérience, quelle que soit votre performance. Cela dit, vous recevrez un bonus financier proportionnel à votre performance. En effet, à la fin de l'expérience, nous sélectionnerons </a:t>
+            </a:r>
+            <a:r>
+              <a:rPr lang="fr-FR" sz="2000" dirty="0">
+                <a:solidFill>
+                  <a:srgbClr val="FF0000"/>
+                </a:solidFill>
+              </a:rPr>
+              <a:t>10 essais </a:t>
+            </a:r>
+            <a:r>
+              <a:rPr lang="fr-FR" sz="2000" dirty="0"/>
+              <a:t>de chaque jeu au hasard, et vous recevrez la somme d'argent qui leur correspond (2 euros ou 5 centimes si vous avez répondu correctement, rien sinon).</a:t>
+            </a:r>
+          </a:p>
+          <a:p>
+            <a:endParaRPr lang="fr-FR" dirty="0"/>
+          </a:p>
+        </p:txBody>
+      </p:sp>
+      <p:sp>
+        <p:nvSpPr>
+          <p:cNvPr id="4" name="Rectangle 3"/>
+          <p:cNvSpPr/>
+          <p:nvPr/>
+        </p:nvSpPr>
+        <p:spPr>
+          <a:xfrm>
+            <a:off x="4121486" y="6369919"/>
+            <a:ext cx="3949030" cy="400110"/>
+          </a:xfrm>
+          <a:prstGeom prst="rect">
+            <a:avLst/>
+          </a:prstGeom>
+        </p:spPr>
+        <p:txBody>
+          <a:bodyPr wrap="none">
+            <a:spAutoFit/>
+          </a:bodyPr>
+          <a:lstStyle/>
+          <a:p>
+            <a:r>
+              <a:rPr lang="fr-FR" sz="2000" i="1" dirty="0">
+                <a:solidFill>
+                  <a:schemeClr val="tx1">
+                    <a:lumMod val="50000"/>
+                    <a:lumOff val="50000"/>
+                  </a:schemeClr>
+                </a:solidFill>
+              </a:rPr>
+              <a:t>Appuyez sur [espace] pour continuer</a:t>
+            </a:r>
+          </a:p>
+        </p:txBody>
+      </p:sp>
+    </p:spTree>
+    <p:extLst>
+      <p:ext uri="{BB962C8B-B14F-4D97-AF65-F5344CB8AC3E}">
+        <p14:creationId xmlns:p14="http://schemas.microsoft.com/office/powerpoint/2010/main" val="4012922657"/>
+      </p:ext>
+    </p:extLst>
+  </p:cSld>
+  <p:clrMapOvr>
+    <a:masterClrMapping/>
+  </p:clrMapOvr>
+  <p:timing>
+    <p:tnLst>
+      <p:par>
+        <p:cTn id="1" dur="indefinite" restart="never" nodeType="tmRoot"/>
+      </p:par>
+    </p:tnLst>
+  </p:timing>
+</p:sld>
+</file>
+
+<file path=ppt/slides/slide3.xml><?xml version="1.0" encoding="utf-8"?>
 <p:sld xmlns:a="http://schemas.openxmlformats.org/drawingml/2006/main" xmlns:r="http://schemas.openxmlformats.org/officeDocument/2006/relationships" xmlns:p="http://schemas.openxmlformats.org/presentationml/2006/main">
   <p:cSld>
     <p:spTree>
@@ -5057,10 +4467,17 @@
   <p:clrMapOvr>
     <a:masterClrMapping/>
   </p:clrMapOvr>
+  <p:timing>
+    <p:tnLst>
+      <p:par>
+        <p:cTn id="1" dur="indefinite" restart="never" nodeType="tmRoot"/>
+      </p:par>
+    </p:tnLst>
+  </p:timing>
 </p:sld>
 </file>
 
-<file path=ppt/slides/slide9.xml><?xml version="1.0" encoding="utf-8"?>
+<file path=ppt/slides/slide4.xml><?xml version="1.0" encoding="utf-8"?>
 <p:sld xmlns:a="http://schemas.openxmlformats.org/drawingml/2006/main" xmlns:r="http://schemas.openxmlformats.org/officeDocument/2006/relationships" xmlns:p="http://schemas.openxmlformats.org/presentationml/2006/main">
   <p:cSld>
     <p:spTree>
@@ -5209,6 +4626,554 @@
             <a:extLst>
               <a:ext uri="{FF2B5EF4-FFF2-40B4-BE49-F238E27FC236}">
                 <a16:creationId xmlns:a16="http://schemas.microsoft.com/office/drawing/2014/main" id="{6EF90E88-D296-4FF3-A63C-D08DFDD8B693}"/>
+              </a:ext>
+            </a:extLst>
+          </p:cNvPr>
+          <p:cNvPicPr>
+            <a:picLocks noChangeAspect="1"/>
+          </p:cNvPicPr>
+          <p:nvPr/>
+        </p:nvPicPr>
+        <p:blipFill>
+          <a:blip r:embed="rId2">
+            <a:extLst>
+              <a:ext uri="{28A0092B-C50C-407E-A947-70E740481C1C}">
+                <a14:useLocalDpi xmlns:a14="http://schemas.microsoft.com/office/drawing/2010/main" val="0"/>
+              </a:ext>
+            </a:extLst>
+          </a:blip>
+          <a:stretch>
+            <a:fillRect/>
+          </a:stretch>
+        </p:blipFill>
+        <p:spPr>
+          <a:xfrm>
+            <a:off x="0" y="-283266"/>
+            <a:ext cx="12192000" cy="6858000"/>
+          </a:xfrm>
+          <a:prstGeom prst="rect">
+            <a:avLst/>
+          </a:prstGeom>
+        </p:spPr>
+      </p:pic>
+    </p:spTree>
+    <p:extLst>
+      <p:ext uri="{BB962C8B-B14F-4D97-AF65-F5344CB8AC3E}">
+        <p14:creationId xmlns:p14="http://schemas.microsoft.com/office/powerpoint/2010/main" val="1662341803"/>
+      </p:ext>
+    </p:extLst>
+  </p:cSld>
+  <p:clrMapOvr>
+    <a:masterClrMapping/>
+  </p:clrMapOvr>
+  <p:timing>
+    <p:tnLst>
+      <p:par>
+        <p:cTn id="1" dur="indefinite" restart="never" nodeType="tmRoot"/>
+      </p:par>
+    </p:tnLst>
+  </p:timing>
+</p:sld>
+</file>
+
+<file path=ppt/slides/slide5.xml><?xml version="1.0" encoding="utf-8"?>
+<p:sld xmlns:a="http://schemas.openxmlformats.org/drawingml/2006/main" xmlns:r="http://schemas.openxmlformats.org/officeDocument/2006/relationships" xmlns:p="http://schemas.openxmlformats.org/presentationml/2006/main">
+  <p:cSld>
+    <p:spTree>
+      <p:nvGrpSpPr>
+        <p:cNvPr id="1" name=""/>
+        <p:cNvGrpSpPr/>
+        <p:nvPr/>
+      </p:nvGrpSpPr>
+      <p:grpSpPr>
+        <a:xfrm>
+          <a:off x="0" y="0"/>
+          <a:ext cx="0" cy="0"/>
+          <a:chOff x="0" y="0"/>
+          <a:chExt cx="0" cy="0"/>
+        </a:xfrm>
+      </p:grpSpPr>
+      <p:sp>
+        <p:nvSpPr>
+          <p:cNvPr id="2" name="Titre 1"/>
+          <p:cNvSpPr>
+            <a:spLocks noGrp="1"/>
+          </p:cNvSpPr>
+          <p:nvPr>
+            <p:ph type="title"/>
+          </p:nvPr>
+        </p:nvSpPr>
+        <p:spPr/>
+        <p:txBody>
+          <a:bodyPr/>
+          <a:lstStyle/>
+          <a:p>
+            <a:r>
+              <a:rPr lang="fr-FR" dirty="0"/>
+              <a:t>Entrainement pour le </a:t>
+            </a:r>
+            <a:r>
+              <a:rPr lang="fr-FR" i="1" dirty="0"/>
+              <a:t>jeu de détection</a:t>
+            </a:r>
+            <a:endParaRPr lang="fr-FR" dirty="0"/>
+          </a:p>
+        </p:txBody>
+      </p:sp>
+      <p:sp>
+        <p:nvSpPr>
+          <p:cNvPr id="5" name="Espace réservé du contenu 4"/>
+          <p:cNvSpPr>
+            <a:spLocks noGrp="1"/>
+          </p:cNvSpPr>
+          <p:nvPr>
+            <p:ph idx="1"/>
+          </p:nvPr>
+        </p:nvSpPr>
+        <p:spPr>
+          <a:xfrm>
+            <a:off x="838200" y="1825625"/>
+            <a:ext cx="10608425" cy="4351338"/>
+          </a:xfrm>
+        </p:spPr>
+        <p:txBody>
+          <a:bodyPr/>
+          <a:lstStyle/>
+          <a:p>
+            <a:pPr marL="0" indent="0">
+              <a:buNone/>
+            </a:pPr>
+            <a:endParaRPr lang="fr-FR" sz="2000" dirty="0"/>
+          </a:p>
+          <a:p>
+            <a:pPr marL="0" indent="0">
+              <a:buNone/>
+            </a:pPr>
+            <a:endParaRPr lang="fr-FR" sz="2000" dirty="0"/>
+          </a:p>
+          <a:p>
+            <a:pPr marL="0" indent="0">
+              <a:buNone/>
+            </a:pPr>
+            <a:r>
+              <a:rPr lang="fr-FR" sz="2000" dirty="0"/>
+              <a:t>Vous allez maintenant avoir plusieurs essais d’entrainement. </a:t>
+            </a:r>
+          </a:p>
+          <a:p>
+            <a:endParaRPr lang="fr-FR" sz="2000" dirty="0"/>
+          </a:p>
+          <a:p>
+            <a:pPr marL="0" indent="0">
+              <a:buNone/>
+            </a:pPr>
+            <a:endParaRPr lang="fr-FR" sz="2000" dirty="0"/>
+          </a:p>
+          <a:p>
+            <a:pPr marL="0" indent="0">
+              <a:buNone/>
+            </a:pPr>
+            <a:r>
+              <a:rPr lang="fr-FR" sz="2000" dirty="0"/>
+              <a:t>Votre performance dans cette phase ne sera pas prise en compte pour votre bonus financier. </a:t>
+            </a:r>
+          </a:p>
+          <a:p>
+            <a:pPr marL="0" indent="0">
+              <a:buNone/>
+            </a:pPr>
+            <a:endParaRPr lang="fr-FR" sz="2000" dirty="0"/>
+          </a:p>
+          <a:p>
+            <a:pPr marL="0" indent="0">
+              <a:buNone/>
+            </a:pPr>
+            <a:endParaRPr lang="fr-FR" sz="2000" dirty="0"/>
+          </a:p>
+          <a:p>
+            <a:pPr marL="0" indent="0">
+              <a:buNone/>
+            </a:pPr>
+            <a:r>
+              <a:rPr lang="fr-FR" sz="2000" dirty="0"/>
+              <a:t>Rappelez-vous d’utiliser la touche [O] pour répondre « Oui » et la touche [N] pour répondre « Non ». </a:t>
+            </a:r>
+          </a:p>
+          <a:p>
+            <a:endParaRPr lang="fr-FR" dirty="0"/>
+          </a:p>
+        </p:txBody>
+      </p:sp>
+      <p:sp>
+        <p:nvSpPr>
+          <p:cNvPr id="4" name="Rectangle 3"/>
+          <p:cNvSpPr/>
+          <p:nvPr/>
+        </p:nvSpPr>
+        <p:spPr>
+          <a:xfrm>
+            <a:off x="4121486" y="6369919"/>
+            <a:ext cx="3949030" cy="400110"/>
+          </a:xfrm>
+          <a:prstGeom prst="rect">
+            <a:avLst/>
+          </a:prstGeom>
+        </p:spPr>
+        <p:txBody>
+          <a:bodyPr wrap="none">
+            <a:spAutoFit/>
+          </a:bodyPr>
+          <a:lstStyle/>
+          <a:p>
+            <a:r>
+              <a:rPr lang="fr-FR" sz="2000" i="1" dirty="0">
+                <a:solidFill>
+                  <a:schemeClr val="tx1">
+                    <a:lumMod val="50000"/>
+                    <a:lumOff val="50000"/>
+                  </a:schemeClr>
+                </a:solidFill>
+              </a:rPr>
+              <a:t>Appuyez sur [espace] pour continuer</a:t>
+            </a:r>
+          </a:p>
+        </p:txBody>
+      </p:sp>
+    </p:spTree>
+    <p:extLst>
+      <p:ext uri="{BB962C8B-B14F-4D97-AF65-F5344CB8AC3E}">
+        <p14:creationId xmlns:p14="http://schemas.microsoft.com/office/powerpoint/2010/main" val="2071561818"/>
+      </p:ext>
+    </p:extLst>
+  </p:cSld>
+  <p:clrMapOvr>
+    <a:masterClrMapping/>
+  </p:clrMapOvr>
+  <p:timing>
+    <p:tnLst>
+      <p:par>
+        <p:cTn id="1" dur="indefinite" restart="never" nodeType="tmRoot"/>
+      </p:par>
+    </p:tnLst>
+  </p:timing>
+</p:sld>
+</file>
+
+<file path=ppt/slides/slide6.xml><?xml version="1.0" encoding="utf-8"?>
+<p:sld xmlns:a="http://schemas.openxmlformats.org/drawingml/2006/main" xmlns:r="http://schemas.openxmlformats.org/officeDocument/2006/relationships" xmlns:p="http://schemas.openxmlformats.org/presentationml/2006/main">
+  <p:cSld>
+    <p:spTree>
+      <p:nvGrpSpPr>
+        <p:cNvPr id="1" name=""/>
+        <p:cNvGrpSpPr/>
+        <p:nvPr/>
+      </p:nvGrpSpPr>
+      <p:grpSpPr>
+        <a:xfrm>
+          <a:off x="0" y="0"/>
+          <a:ext cx="0" cy="0"/>
+          <a:chOff x="0" y="0"/>
+          <a:chExt cx="0" cy="0"/>
+        </a:xfrm>
+      </p:grpSpPr>
+      <p:sp>
+        <p:nvSpPr>
+          <p:cNvPr id="2" name="Titre 1"/>
+          <p:cNvSpPr>
+            <a:spLocks noGrp="1"/>
+          </p:cNvSpPr>
+          <p:nvPr>
+            <p:ph type="title"/>
+          </p:nvPr>
+        </p:nvSpPr>
+        <p:spPr/>
+        <p:txBody>
+          <a:bodyPr/>
+          <a:lstStyle/>
+          <a:p>
+            <a:r>
+              <a:rPr lang="fr-FR" dirty="0"/>
+              <a:t>Fin entrainement pour le </a:t>
+            </a:r>
+            <a:r>
+              <a:rPr lang="fr-FR" i="1" dirty="0"/>
+              <a:t>jeu de détection</a:t>
+            </a:r>
+            <a:endParaRPr lang="fr-FR" dirty="0"/>
+          </a:p>
+        </p:txBody>
+      </p:sp>
+      <p:sp>
+        <p:nvSpPr>
+          <p:cNvPr id="5" name="Espace réservé du contenu 4"/>
+          <p:cNvSpPr>
+            <a:spLocks noGrp="1"/>
+          </p:cNvSpPr>
+          <p:nvPr>
+            <p:ph idx="1"/>
+          </p:nvPr>
+        </p:nvSpPr>
+        <p:spPr>
+          <a:xfrm>
+            <a:off x="838200" y="1825625"/>
+            <a:ext cx="10608425" cy="4351338"/>
+          </a:xfrm>
+        </p:spPr>
+        <p:txBody>
+          <a:bodyPr/>
+          <a:lstStyle/>
+          <a:p>
+            <a:pPr marL="0" indent="0">
+              <a:buNone/>
+            </a:pPr>
+            <a:endParaRPr lang="fr-FR" sz="2000" dirty="0"/>
+          </a:p>
+          <a:p>
+            <a:pPr marL="0" indent="0">
+              <a:buNone/>
+            </a:pPr>
+            <a:endParaRPr lang="fr-FR" sz="2000" dirty="0"/>
+          </a:p>
+          <a:p>
+            <a:pPr marL="0" indent="0">
+              <a:buNone/>
+            </a:pPr>
+            <a:r>
+              <a:rPr lang="fr-FR" sz="2000" dirty="0"/>
+              <a:t>L’entrainement </a:t>
+            </a:r>
+            <a:r>
+              <a:rPr lang="fr-FR" sz="2000" strike="sngStrike" dirty="0"/>
+              <a:t>du </a:t>
+            </a:r>
+            <a:r>
+              <a:rPr lang="fr-FR" sz="2000" i="1" strike="sngStrike" dirty="0"/>
+              <a:t>jeu de détection </a:t>
+            </a:r>
+            <a:r>
+              <a:rPr lang="fr-FR" sz="2000" dirty="0"/>
+              <a:t>est terminé.  Vous allez maintenant commencer le jeu. </a:t>
+            </a:r>
+          </a:p>
+          <a:p>
+            <a:pPr marL="0" indent="0">
+              <a:buNone/>
+            </a:pPr>
+            <a:endParaRPr lang="fr-FR" sz="2000" dirty="0"/>
+          </a:p>
+          <a:p>
+            <a:pPr marL="0" indent="0">
+              <a:buNone/>
+            </a:pPr>
+            <a:endParaRPr lang="fr-FR" sz="2000" dirty="0"/>
+          </a:p>
+          <a:p>
+            <a:pPr marL="0" indent="0">
+              <a:buNone/>
+            </a:pPr>
+            <a:r>
+              <a:rPr lang="fr-FR" sz="2000" dirty="0"/>
+              <a:t>Votre performance dans cette phase sera prise en compte pour votre bonus financier. </a:t>
+            </a:r>
+          </a:p>
+          <a:p>
+            <a:pPr marL="0" indent="0">
+              <a:buNone/>
+            </a:pPr>
+            <a:endParaRPr lang="fr-FR" sz="2000" dirty="0"/>
+          </a:p>
+          <a:p>
+            <a:pPr marL="0" indent="0">
+              <a:buNone/>
+            </a:pPr>
+            <a:endParaRPr lang="fr-FR" sz="2000" dirty="0"/>
+          </a:p>
+          <a:p>
+            <a:pPr marL="0" indent="0">
+              <a:buNone/>
+            </a:pPr>
+            <a:r>
+              <a:rPr lang="fr-FR" sz="2000" dirty="0"/>
+              <a:t>Rappelez-vous d’utiliser la touche [O] pour répondre « Oui » et la touche [N] pour répondre « Non ». </a:t>
+            </a:r>
+          </a:p>
+          <a:p>
+            <a:pPr marL="0" indent="0">
+              <a:buNone/>
+            </a:pPr>
+            <a:endParaRPr lang="fr-FR" sz="2000" dirty="0"/>
+          </a:p>
+          <a:p>
+            <a:pPr marL="0" indent="0">
+              <a:buNone/>
+            </a:pPr>
+            <a:endParaRPr lang="fr-FR" sz="2000" dirty="0"/>
+          </a:p>
+          <a:p>
+            <a:pPr marL="0" indent="0">
+              <a:buNone/>
+            </a:pPr>
+            <a:endParaRPr lang="fr-FR" sz="2000" dirty="0"/>
+          </a:p>
+          <a:p>
+            <a:pPr marL="0" indent="0">
+              <a:buNone/>
+            </a:pPr>
+            <a:endParaRPr lang="fr-FR" dirty="0"/>
+          </a:p>
+        </p:txBody>
+      </p:sp>
+      <p:sp>
+        <p:nvSpPr>
+          <p:cNvPr id="4" name="Rectangle 3"/>
+          <p:cNvSpPr/>
+          <p:nvPr/>
+        </p:nvSpPr>
+        <p:spPr>
+          <a:xfrm>
+            <a:off x="4121486" y="6369919"/>
+            <a:ext cx="3949030" cy="400110"/>
+          </a:xfrm>
+          <a:prstGeom prst="rect">
+            <a:avLst/>
+          </a:prstGeom>
+        </p:spPr>
+        <p:txBody>
+          <a:bodyPr wrap="none">
+            <a:spAutoFit/>
+          </a:bodyPr>
+          <a:lstStyle/>
+          <a:p>
+            <a:r>
+              <a:rPr lang="fr-FR" sz="2000" i="1" dirty="0">
+                <a:solidFill>
+                  <a:schemeClr val="tx1">
+                    <a:lumMod val="50000"/>
+                    <a:lumOff val="50000"/>
+                  </a:schemeClr>
+                </a:solidFill>
+              </a:rPr>
+              <a:t>Appuyez sur [espace] pour continuer</a:t>
+            </a:r>
+          </a:p>
+        </p:txBody>
+      </p:sp>
+    </p:spTree>
+    <p:extLst>
+      <p:ext uri="{BB962C8B-B14F-4D97-AF65-F5344CB8AC3E}">
+        <p14:creationId xmlns:p14="http://schemas.microsoft.com/office/powerpoint/2010/main" val="3249193195"/>
+      </p:ext>
+    </p:extLst>
+  </p:cSld>
+  <p:clrMapOvr>
+    <a:masterClrMapping/>
+  </p:clrMapOvr>
+  <p:timing>
+    <p:tnLst>
+      <p:par>
+        <p:cTn id="1" dur="indefinite" restart="never" nodeType="tmRoot"/>
+      </p:par>
+    </p:tnLst>
+  </p:timing>
+</p:sld>
+</file>
+
+<file path=ppt/slides/slide7.xml><?xml version="1.0" encoding="utf-8"?>
+<p:sld xmlns:a="http://schemas.openxmlformats.org/drawingml/2006/main" xmlns:r="http://schemas.openxmlformats.org/officeDocument/2006/relationships" xmlns:p="http://schemas.openxmlformats.org/presentationml/2006/main">
+  <p:cSld>
+    <p:spTree>
+      <p:nvGrpSpPr>
+        <p:cNvPr id="1" name=""/>
+        <p:cNvGrpSpPr/>
+        <p:nvPr/>
+      </p:nvGrpSpPr>
+      <p:grpSpPr>
+        <a:xfrm>
+          <a:off x="0" y="0"/>
+          <a:ext cx="0" cy="0"/>
+          <a:chOff x="0" y="0"/>
+          <a:chExt cx="0" cy="0"/>
+        </a:xfrm>
+      </p:grpSpPr>
+      <p:pic>
+        <p:nvPicPr>
+          <p:cNvPr id="7" name="Picture 6" descr="A close up of a device&#10;&#10;Description automatically generated">
+            <a:extLst>
+              <a:ext uri="{FF2B5EF4-FFF2-40B4-BE49-F238E27FC236}">
+                <a16:creationId xmlns:a16="http://schemas.microsoft.com/office/drawing/2014/main" id="{D0732A4D-E3B0-48A9-97C2-445083C561E8}"/>
+              </a:ext>
+            </a:extLst>
+          </p:cNvPr>
+          <p:cNvPicPr>
+            <a:picLocks noChangeAspect="1"/>
+          </p:cNvPicPr>
+          <p:nvPr/>
+        </p:nvPicPr>
+        <p:blipFill>
+          <a:blip r:embed="rId2">
+            <a:extLst>
+              <a:ext uri="{28A0092B-C50C-407E-A947-70E740481C1C}">
+                <a14:useLocalDpi xmlns:a14="http://schemas.microsoft.com/office/drawing/2010/main" val="0"/>
+              </a:ext>
+            </a:extLst>
+          </a:blip>
+          <a:stretch>
+            <a:fillRect/>
+          </a:stretch>
+        </p:blipFill>
+        <p:spPr>
+          <a:xfrm>
+            <a:off x="0" y="-23598"/>
+            <a:ext cx="12192000" cy="6858000"/>
+          </a:xfrm>
+          <a:prstGeom prst="rect">
+            <a:avLst/>
+          </a:prstGeom>
+        </p:spPr>
+      </p:pic>
+    </p:spTree>
+    <p:extLst>
+      <p:ext uri="{BB962C8B-B14F-4D97-AF65-F5344CB8AC3E}">
+        <p14:creationId xmlns:p14="http://schemas.microsoft.com/office/powerpoint/2010/main" val="3300649912"/>
+      </p:ext>
+    </p:extLst>
+  </p:cSld>
+  <p:clrMapOvr>
+    <a:masterClrMapping/>
+  </p:clrMapOvr>
+  <p:timing>
+    <p:tnLst>
+      <p:par>
+        <p:cTn id="1" dur="indefinite" restart="never" nodeType="tmRoot"/>
+      </p:par>
+    </p:tnLst>
+  </p:timing>
+</p:sld>
+</file>
+
+<file path=ppt/slides/slide8.xml><?xml version="1.0" encoding="utf-8"?>
+<p:sld xmlns:a="http://schemas.openxmlformats.org/drawingml/2006/main" xmlns:r="http://schemas.openxmlformats.org/officeDocument/2006/relationships" xmlns:p="http://schemas.openxmlformats.org/presentationml/2006/main">
+  <p:cSld>
+    <p:spTree>
+      <p:nvGrpSpPr>
+        <p:cNvPr id="1" name=""/>
+        <p:cNvGrpSpPr/>
+        <p:nvPr/>
+      </p:nvGrpSpPr>
+      <p:grpSpPr>
+        <a:xfrm>
+          <a:off x="0" y="0"/>
+          <a:ext cx="0" cy="0"/>
+          <a:chOff x="0" y="0"/>
+          <a:chExt cx="0" cy="0"/>
+        </a:xfrm>
+      </p:grpSpPr>
+      <p:pic>
+        <p:nvPicPr>
+          <p:cNvPr id="8" name="Picture 7" descr="A picture containing bird, flower, tree&#10;&#10;Description automatically generated">
+            <a:extLst>
+              <a:ext uri="{FF2B5EF4-FFF2-40B4-BE49-F238E27FC236}">
+                <a16:creationId xmlns:a16="http://schemas.microsoft.com/office/drawing/2014/main" id="{54C1346C-62A8-4C20-A0C4-EA84DEF33AAD}"/>
               </a:ext>
             </a:extLst>
           </p:cNvPr>
@@ -5242,13 +5207,93 @@
     </p:spTree>
     <p:extLst>
       <p:ext uri="{BB962C8B-B14F-4D97-AF65-F5344CB8AC3E}">
-        <p14:creationId xmlns:p14="http://schemas.microsoft.com/office/powerpoint/2010/main" val="1662341803"/>
+        <p14:creationId xmlns:p14="http://schemas.microsoft.com/office/powerpoint/2010/main" val="885274509"/>
       </p:ext>
     </p:extLst>
   </p:cSld>
   <p:clrMapOvr>
     <a:masterClrMapping/>
   </p:clrMapOvr>
+  <p:timing>
+    <p:tnLst>
+      <p:par>
+        <p:cTn id="1" dur="indefinite" restart="never" nodeType="tmRoot"/>
+      </p:par>
+    </p:tnLst>
+  </p:timing>
+</p:sld>
+</file>
+
+<file path=ppt/slides/slide9.xml><?xml version="1.0" encoding="utf-8"?>
+<p:sld xmlns:a="http://schemas.openxmlformats.org/drawingml/2006/main" xmlns:r="http://schemas.openxmlformats.org/officeDocument/2006/relationships" xmlns:p="http://schemas.openxmlformats.org/presentationml/2006/main">
+  <p:cSld>
+    <p:spTree>
+      <p:nvGrpSpPr>
+        <p:cNvPr id="1" name=""/>
+        <p:cNvGrpSpPr/>
+        <p:nvPr/>
+      </p:nvGrpSpPr>
+      <p:grpSpPr>
+        <a:xfrm>
+          <a:off x="0" y="0"/>
+          <a:ext cx="0" cy="0"/>
+          <a:chOff x="0" y="0"/>
+          <a:chExt cx="0" cy="0"/>
+        </a:xfrm>
+      </p:grpSpPr>
+      <p:pic>
+        <p:nvPicPr>
+          <p:cNvPr id="3" name="Picture 2" descr="A picture containing flower, bird, tree&#10;&#10;Description automatically generated">
+            <a:extLst>
+              <a:ext uri="{FF2B5EF4-FFF2-40B4-BE49-F238E27FC236}">
+                <a16:creationId xmlns:a16="http://schemas.microsoft.com/office/drawing/2014/main" id="{CA35783B-E1D8-412C-93DF-B1AEA0AC50A8}"/>
+              </a:ext>
+            </a:extLst>
+          </p:cNvPr>
+          <p:cNvPicPr>
+            <a:picLocks noChangeAspect="1"/>
+          </p:cNvPicPr>
+          <p:nvPr/>
+        </p:nvPicPr>
+        <p:blipFill>
+          <a:blip r:embed="rId2">
+            <a:extLst>
+              <a:ext uri="{28A0092B-C50C-407E-A947-70E740481C1C}">
+                <a14:useLocalDpi xmlns:a14="http://schemas.microsoft.com/office/drawing/2010/main" val="0"/>
+              </a:ext>
+            </a:extLst>
+          </a:blip>
+          <a:stretch>
+            <a:fillRect/>
+          </a:stretch>
+        </p:blipFill>
+        <p:spPr>
+          <a:xfrm>
+            <a:off x="0" y="0"/>
+            <a:ext cx="12192000" cy="6858000"/>
+          </a:xfrm>
+          <a:prstGeom prst="rect">
+            <a:avLst/>
+          </a:prstGeom>
+        </p:spPr>
+      </p:pic>
+    </p:spTree>
+    <p:extLst>
+      <p:ext uri="{BB962C8B-B14F-4D97-AF65-F5344CB8AC3E}">
+        <p14:creationId xmlns:p14="http://schemas.microsoft.com/office/powerpoint/2010/main" val="288640065"/>
+      </p:ext>
+    </p:extLst>
+  </p:cSld>
+  <p:clrMapOvr>
+    <a:masterClrMapping/>
+  </p:clrMapOvr>
+  <p:timing>
+    <p:tnLst>
+      <p:par>
+        <p:cTn id="1" dur="indefinite" restart="never" nodeType="tmRoot"/>
+      </p:par>
+    </p:tnLst>
+  </p:timing>
 </p:sld>
 </file>
 

</xml_diff>